<commit_message>
working on testing web apps
</commit_message>
<xml_diff>
--- a/presentations/Testing web apps.pptx
+++ b/presentations/Testing web apps.pptx
@@ -5,16 +5,20 @@
     <p:sldMasterId id="2147483648" r:id="rId1"/>
   </p:sldMasterIdLst>
   <p:notesMasterIdLst>
-    <p:notesMasterId r:id="rId9"/>
+    <p:notesMasterId r:id="rId13"/>
   </p:notesMasterIdLst>
   <p:sldIdLst>
     <p:sldId id="257" r:id="rId2"/>
     <p:sldId id="258" r:id="rId3"/>
     <p:sldId id="259" r:id="rId4"/>
-    <p:sldId id="260" r:id="rId5"/>
-    <p:sldId id="261" r:id="rId6"/>
-    <p:sldId id="262" r:id="rId7"/>
-    <p:sldId id="263" r:id="rId8"/>
+    <p:sldId id="263" r:id="rId5"/>
+    <p:sldId id="260" r:id="rId6"/>
+    <p:sldId id="261" r:id="rId7"/>
+    <p:sldId id="264" r:id="rId8"/>
+    <p:sldId id="262" r:id="rId9"/>
+    <p:sldId id="265" r:id="rId10"/>
+    <p:sldId id="266" r:id="rId11"/>
+    <p:sldId id="267" r:id="rId12"/>
   </p:sldIdLst>
   <p:sldSz cx="9144000" cy="6858000" type="screen4x3"/>
   <p:notesSz cx="6858000" cy="9144000"/>
@@ -198,7 +202,8 @@
           <a:p>
             <a:fld id="{4B12C2AF-FB53-4902-8686-E189B5D70A4D}" type="datetimeFigureOut">
               <a:rPr lang="en-US" smtClean="0"/>
-              <a:t>3/8/2013</a:t>
+              <a:pPr/>
+              <a:t>3/9/2013</a:t>
             </a:fld>
             <a:endParaRPr lang="en-US"/>
           </a:p>
@@ -357,6 +362,7 @@
           <a:p>
             <a:fld id="{B90A91D8-B09E-45D4-9BBC-197DC9540887}" type="slidenum">
               <a:rPr lang="en-US" smtClean="0"/>
+              <a:pPr/>
               <a:t>‹#›</a:t>
             </a:fld>
             <a:endParaRPr lang="en-US"/>
@@ -366,7 +372,7 @@
     </p:spTree>
     <p:extLst>
       <p:ext uri="{BB962C8B-B14F-4D97-AF65-F5344CB8AC3E}">
-        <p14:creationId xmlns:p14="http://schemas.microsoft.com/office/powerpoint/2010/main" val="3015537463"/>
+        <p14:creationId xmlns="" xmlns:p14="http://schemas.microsoft.com/office/powerpoint/2010/main" val="3015537463"/>
       </p:ext>
     </p:extLst>
   </p:cSld>
@@ -556,6 +562,397 @@
 </p:notes>
 </file>
 
+<file path=ppt/notesSlides/notesSlide10.xml><?xml version="1.0" encoding="utf-8"?>
+<p:notes xmlns:a="http://schemas.openxmlformats.org/drawingml/2006/main" xmlns:r="http://schemas.openxmlformats.org/officeDocument/2006/relationships" xmlns:p="http://schemas.openxmlformats.org/presentationml/2006/main">
+  <p:cSld>
+    <p:spTree>
+      <p:nvGrpSpPr>
+        <p:cNvPr id="1" name=""/>
+        <p:cNvGrpSpPr/>
+        <p:nvPr/>
+      </p:nvGrpSpPr>
+      <p:grpSpPr>
+        <a:xfrm>
+          <a:off x="0" y="0"/>
+          <a:ext cx="0" cy="0"/>
+          <a:chOff x="0" y="0"/>
+          <a:chExt cx="0" cy="0"/>
+        </a:xfrm>
+      </p:grpSpPr>
+      <p:sp>
+        <p:nvSpPr>
+          <p:cNvPr id="2" name="Slide Image Placeholder 1"/>
+          <p:cNvSpPr>
+            <a:spLocks noGrp="1" noRot="1" noChangeAspect="1"/>
+          </p:cNvSpPr>
+          <p:nvPr>
+            <p:ph type="sldImg"/>
+          </p:nvPr>
+        </p:nvSpPr>
+        <p:spPr/>
+      </p:sp>
+      <p:sp>
+        <p:nvSpPr>
+          <p:cNvPr id="3" name="Notes Placeholder 2"/>
+          <p:cNvSpPr>
+            <a:spLocks noGrp="1"/>
+          </p:cNvSpPr>
+          <p:nvPr>
+            <p:ph type="body" idx="1"/>
+          </p:nvPr>
+        </p:nvSpPr>
+        <p:spPr/>
+        <p:txBody>
+          <a:bodyPr>
+            <a:normAutofit/>
+          </a:bodyPr>
+          <a:lstStyle/>
+          <a:p>
+            <a:r>
+              <a:rPr lang="en-US" sz="1200" kern="1200" dirty="0" smtClean="0">
+                <a:solidFill>
+                  <a:schemeClr val="tx1"/>
+                </a:solidFill>
+                <a:effectLst/>
+                <a:latin typeface="+mn-lt"/>
+                <a:ea typeface="+mn-ea"/>
+                <a:cs typeface="+mn-cs"/>
+              </a:rPr>
+              <a:t>In Google</a:t>
+            </a:r>
+            <a:r>
+              <a:rPr lang="en-US" sz="1200" kern="1200" baseline="0" dirty="0" smtClean="0">
+                <a:solidFill>
+                  <a:schemeClr val="tx1"/>
+                </a:solidFill>
+                <a:effectLst/>
+                <a:latin typeface="+mn-lt"/>
+                <a:ea typeface="+mn-ea"/>
+                <a:cs typeface="+mn-cs"/>
+              </a:rPr>
+              <a:t> Chrome, you can use the developer tools console to set a cookie:</a:t>
+            </a:r>
+          </a:p>
+          <a:p>
+            <a:endParaRPr lang="en-US" sz="1200" b="0" i="0" kern="1200" dirty="0" smtClean="0">
+              <a:solidFill>
+                <a:schemeClr val="tx1"/>
+              </a:solidFill>
+              <a:latin typeface="+mn-lt"/>
+              <a:ea typeface="+mn-ea"/>
+              <a:cs typeface="+mn-cs"/>
+            </a:endParaRPr>
+          </a:p>
+          <a:p>
+            <a:r>
+              <a:rPr lang="en-US" sz="1200" b="0" i="0" kern="1200" dirty="0" err="1" smtClean="0">
+                <a:solidFill>
+                  <a:schemeClr val="tx1"/>
+                </a:solidFill>
+                <a:latin typeface="+mn-lt"/>
+                <a:ea typeface="+mn-ea"/>
+                <a:cs typeface="+mn-cs"/>
+              </a:rPr>
+              <a:t>var</a:t>
+            </a:r>
+            <a:r>
+              <a:rPr lang="en-US" sz="1200" b="0" i="0" kern="1200" dirty="0" smtClean="0">
+                <a:solidFill>
+                  <a:schemeClr val="tx1"/>
+                </a:solidFill>
+                <a:latin typeface="+mn-lt"/>
+                <a:ea typeface="+mn-ea"/>
+                <a:cs typeface="+mn-cs"/>
+              </a:rPr>
+              <a:t> </a:t>
+            </a:r>
+            <a:r>
+              <a:rPr lang="en-US" sz="1200" b="0" i="0" kern="1200" dirty="0" err="1" smtClean="0">
+                <a:solidFill>
+                  <a:schemeClr val="tx1"/>
+                </a:solidFill>
+                <a:latin typeface="+mn-lt"/>
+                <a:ea typeface="+mn-ea"/>
+                <a:cs typeface="+mn-cs"/>
+              </a:rPr>
+              <a:t>expDate</a:t>
+            </a:r>
+            <a:r>
+              <a:rPr lang="en-US" sz="1200" b="0" i="0" kern="1200" dirty="0" smtClean="0">
+                <a:solidFill>
+                  <a:schemeClr val="tx1"/>
+                </a:solidFill>
+                <a:latin typeface="+mn-lt"/>
+                <a:ea typeface="+mn-ea"/>
+                <a:cs typeface="+mn-cs"/>
+              </a:rPr>
+              <a:t> = new Date();</a:t>
+            </a:r>
+          </a:p>
+          <a:p>
+            <a:r>
+              <a:rPr lang="en-US" sz="1200" b="0" i="0" kern="1200" dirty="0" err="1" smtClean="0">
+                <a:solidFill>
+                  <a:schemeClr val="tx1"/>
+                </a:solidFill>
+                <a:latin typeface="+mn-lt"/>
+                <a:ea typeface="+mn-ea"/>
+                <a:cs typeface="+mn-cs"/>
+              </a:rPr>
+              <a:t>expDate.setDate</a:t>
+            </a:r>
+            <a:r>
+              <a:rPr lang="en-US" sz="1200" b="0" i="0" kern="1200" dirty="0" smtClean="0">
+                <a:solidFill>
+                  <a:schemeClr val="tx1"/>
+                </a:solidFill>
+                <a:latin typeface="+mn-lt"/>
+                <a:ea typeface="+mn-ea"/>
+                <a:cs typeface="+mn-cs"/>
+              </a:rPr>
+              <a:t>(</a:t>
+            </a:r>
+            <a:r>
+              <a:rPr lang="en-US" sz="1200" b="0" i="0" kern="1200" dirty="0" err="1" smtClean="0">
+                <a:solidFill>
+                  <a:schemeClr val="tx1"/>
+                </a:solidFill>
+                <a:latin typeface="+mn-lt"/>
+                <a:ea typeface="+mn-ea"/>
+                <a:cs typeface="+mn-cs"/>
+              </a:rPr>
+              <a:t>expDate.getDate</a:t>
+            </a:r>
+            <a:r>
+              <a:rPr lang="en-US" sz="1200" b="0" i="0" kern="1200" dirty="0" smtClean="0">
+                <a:solidFill>
+                  <a:schemeClr val="tx1"/>
+                </a:solidFill>
+                <a:latin typeface="+mn-lt"/>
+                <a:ea typeface="+mn-ea"/>
+                <a:cs typeface="+mn-cs"/>
+              </a:rPr>
+              <a:t>() + 1);</a:t>
+            </a:r>
+          </a:p>
+          <a:p>
+            <a:endParaRPr lang="en-US" sz="1200" b="0" i="0" kern="1200" baseline="0" dirty="0" smtClean="0">
+              <a:solidFill>
+                <a:schemeClr val="tx1"/>
+              </a:solidFill>
+              <a:effectLst/>
+              <a:latin typeface="+mn-lt"/>
+              <a:ea typeface="+mn-ea"/>
+              <a:cs typeface="+mn-cs"/>
+            </a:endParaRPr>
+          </a:p>
+          <a:p>
+            <a:r>
+              <a:rPr lang="en-US" sz="1200" b="0" i="0" kern="1200" dirty="0" err="1" smtClean="0">
+                <a:solidFill>
+                  <a:schemeClr val="tx1"/>
+                </a:solidFill>
+                <a:latin typeface="+mn-lt"/>
+                <a:ea typeface="+mn-ea"/>
+                <a:cs typeface="+mn-cs"/>
+              </a:rPr>
+              <a:t>document.cookie</a:t>
+            </a:r>
+            <a:r>
+              <a:rPr lang="en-US" sz="1200" b="0" i="0" kern="1200" dirty="0" smtClean="0">
+                <a:solidFill>
+                  <a:schemeClr val="tx1"/>
+                </a:solidFill>
+                <a:latin typeface="+mn-lt"/>
+                <a:ea typeface="+mn-ea"/>
+                <a:cs typeface="+mn-cs"/>
+              </a:rPr>
+              <a:t>=</a:t>
+            </a:r>
+            <a:r>
+              <a:rPr lang="en-US" sz="1200" b="0" i="0" kern="1200" baseline="0" dirty="0" smtClean="0">
+                <a:solidFill>
+                  <a:schemeClr val="tx1"/>
+                </a:solidFill>
+                <a:effectLst/>
+                <a:latin typeface="+mn-lt"/>
+                <a:ea typeface="+mn-ea"/>
+                <a:cs typeface="+mn-cs"/>
+              </a:rPr>
+              <a:t>“key=value; Expires=“ + exp;</a:t>
+            </a:r>
+          </a:p>
+          <a:p>
+            <a:endParaRPr lang="en-US" sz="1200" b="0" i="0" kern="1200" baseline="0" dirty="0" smtClean="0">
+              <a:solidFill>
+                <a:schemeClr val="tx1"/>
+              </a:solidFill>
+              <a:effectLst/>
+              <a:latin typeface="+mn-lt"/>
+              <a:ea typeface="+mn-ea"/>
+              <a:cs typeface="+mn-cs"/>
+            </a:endParaRPr>
+          </a:p>
+          <a:p>
+            <a:endParaRPr lang="en-US" sz="1200" b="0" i="0" kern="1200" baseline="0" dirty="0" smtClean="0">
+              <a:solidFill>
+                <a:schemeClr val="tx1"/>
+              </a:solidFill>
+              <a:effectLst/>
+              <a:latin typeface="+mn-lt"/>
+              <a:ea typeface="+mn-ea"/>
+              <a:cs typeface="+mn-cs"/>
+            </a:endParaRPr>
+          </a:p>
+          <a:p>
+            <a:r>
+              <a:rPr lang="en-US" sz="1200" b="0" i="0" kern="1200" baseline="0" dirty="0" smtClean="0">
+                <a:solidFill>
+                  <a:schemeClr val="tx1"/>
+                </a:solidFill>
+                <a:effectLst/>
+                <a:latin typeface="+mn-lt"/>
+                <a:ea typeface="+mn-ea"/>
+                <a:cs typeface="+mn-cs"/>
+              </a:rPr>
+              <a:t>https://chrome.google.com/webstore/detail/chocochip-cookie-manager/cdllihdpcibkhhkidaicoeeiammjkokm/related?hl=en-US	</a:t>
+            </a:r>
+          </a:p>
+        </p:txBody>
+      </p:sp>
+      <p:sp>
+        <p:nvSpPr>
+          <p:cNvPr id="4" name="Slide Number Placeholder 3"/>
+          <p:cNvSpPr>
+            <a:spLocks noGrp="1"/>
+          </p:cNvSpPr>
+          <p:nvPr>
+            <p:ph type="sldNum" sz="quarter" idx="10"/>
+          </p:nvPr>
+        </p:nvSpPr>
+        <p:spPr/>
+        <p:txBody>
+          <a:bodyPr/>
+          <a:lstStyle/>
+          <a:p>
+            <a:fld id="{2468E330-6F11-4EB8-9125-0BEE82D16730}" type="slidenum">
+              <a:rPr lang="en-US" smtClean="0"/>
+              <a:pPr/>
+              <a:t>10</a:t>
+            </a:fld>
+            <a:endParaRPr lang="en-US"/>
+          </a:p>
+        </p:txBody>
+      </p:sp>
+    </p:spTree>
+  </p:cSld>
+  <p:clrMapOvr>
+    <a:masterClrMapping/>
+  </p:clrMapOvr>
+</p:notes>
+</file>
+
+<file path=ppt/notesSlides/notesSlide11.xml><?xml version="1.0" encoding="utf-8"?>
+<p:notes xmlns:a="http://schemas.openxmlformats.org/drawingml/2006/main" xmlns:r="http://schemas.openxmlformats.org/officeDocument/2006/relationships" xmlns:p="http://schemas.openxmlformats.org/presentationml/2006/main">
+  <p:cSld>
+    <p:spTree>
+      <p:nvGrpSpPr>
+        <p:cNvPr id="1" name=""/>
+        <p:cNvGrpSpPr/>
+        <p:nvPr/>
+      </p:nvGrpSpPr>
+      <p:grpSpPr>
+        <a:xfrm>
+          <a:off x="0" y="0"/>
+          <a:ext cx="0" cy="0"/>
+          <a:chOff x="0" y="0"/>
+          <a:chExt cx="0" cy="0"/>
+        </a:xfrm>
+      </p:grpSpPr>
+      <p:sp>
+        <p:nvSpPr>
+          <p:cNvPr id="2" name="Slide Image Placeholder 1"/>
+          <p:cNvSpPr>
+            <a:spLocks noGrp="1" noRot="1" noChangeAspect="1"/>
+          </p:cNvSpPr>
+          <p:nvPr>
+            <p:ph type="sldImg"/>
+          </p:nvPr>
+        </p:nvSpPr>
+        <p:spPr/>
+      </p:sp>
+      <p:sp>
+        <p:nvSpPr>
+          <p:cNvPr id="3" name="Notes Placeholder 2"/>
+          <p:cNvSpPr>
+            <a:spLocks noGrp="1"/>
+          </p:cNvSpPr>
+          <p:nvPr>
+            <p:ph type="body" idx="1"/>
+          </p:nvPr>
+        </p:nvSpPr>
+        <p:spPr/>
+        <p:txBody>
+          <a:bodyPr>
+            <a:normAutofit/>
+          </a:bodyPr>
+          <a:lstStyle/>
+          <a:p>
+            <a:r>
+              <a:rPr lang="en-US" sz="1200" dirty="0" smtClean="0"/>
+              <a:t>Control Panel -&gt; Clock, Language and Region -&gt; Regional and Language Options -&gt; Administrative</a:t>
+            </a:r>
+            <a:r>
+              <a:rPr lang="en-US" sz="1200" baseline="0" dirty="0" smtClean="0"/>
+              <a:t> tab -&gt; Languages for non Unicode programs (System Locale) -&gt; Change System Locale (Restart)</a:t>
+            </a:r>
+            <a:endParaRPr lang="en-US" sz="1200" dirty="0" smtClean="0"/>
+          </a:p>
+          <a:p>
+            <a:endParaRPr lang="en-US" sz="1200" kern="1200" baseline="0" dirty="0" smtClean="0">
+              <a:solidFill>
+                <a:schemeClr val="tx1"/>
+              </a:solidFill>
+              <a:effectLst/>
+              <a:latin typeface="+mn-lt"/>
+              <a:ea typeface="+mn-ea"/>
+              <a:cs typeface="+mn-cs"/>
+            </a:endParaRPr>
+          </a:p>
+        </p:txBody>
+      </p:sp>
+      <p:sp>
+        <p:nvSpPr>
+          <p:cNvPr id="4" name="Slide Number Placeholder 3"/>
+          <p:cNvSpPr>
+            <a:spLocks noGrp="1"/>
+          </p:cNvSpPr>
+          <p:nvPr>
+            <p:ph type="sldNum" sz="quarter" idx="10"/>
+          </p:nvPr>
+        </p:nvSpPr>
+        <p:spPr/>
+        <p:txBody>
+          <a:bodyPr/>
+          <a:lstStyle/>
+          <a:p>
+            <a:fld id="{2468E330-6F11-4EB8-9125-0BEE82D16730}" type="slidenum">
+              <a:rPr lang="en-US" smtClean="0"/>
+              <a:pPr/>
+              <a:t>11</a:t>
+            </a:fld>
+            <a:endParaRPr lang="en-US"/>
+          </a:p>
+        </p:txBody>
+      </p:sp>
+    </p:spTree>
+  </p:cSld>
+  <p:clrMapOvr>
+    <a:masterClrMapping/>
+  </p:clrMapOvr>
+</p:notes>
+</file>
+
 <file path=ppt/notesSlides/notesSlide2.xml><?xml version="1.0" encoding="utf-8"?>
 <p:notes xmlns:a="http://schemas.openxmlformats.org/drawingml/2006/main" xmlns:r="http://schemas.openxmlformats.org/officeDocument/2006/relationships" xmlns:p="http://schemas.openxmlformats.org/presentationml/2006/main">
   <p:cSld>
@@ -872,6 +1269,66 @@
           </a:bodyPr>
           <a:lstStyle/>
           <a:p>
+            <a:endParaRPr lang="en-US" sz="1200" kern="1200" dirty="0" smtClean="0">
+              <a:solidFill>
+                <a:schemeClr val="tx1"/>
+              </a:solidFill>
+              <a:effectLst/>
+              <a:latin typeface="+mn-lt"/>
+              <a:ea typeface="+mn-ea"/>
+              <a:cs typeface="+mn-cs"/>
+            </a:endParaRPr>
+          </a:p>
+          <a:p>
+            <a:r>
+              <a:rPr lang="en-US" sz="1200" kern="1200" dirty="0" smtClean="0">
+                <a:solidFill>
+                  <a:schemeClr val="tx1"/>
+                </a:solidFill>
+                <a:effectLst/>
+                <a:latin typeface="+mn-lt"/>
+                <a:ea typeface="+mn-ea"/>
+                <a:cs typeface="+mn-cs"/>
+              </a:rPr>
+              <a:t>Chrome</a:t>
+            </a:r>
+            <a:r>
+              <a:rPr lang="en-US" sz="1200" kern="1200" baseline="0" dirty="0" smtClean="0">
+                <a:solidFill>
+                  <a:schemeClr val="tx1"/>
+                </a:solidFill>
+                <a:effectLst/>
+                <a:latin typeface="+mn-lt"/>
+                <a:ea typeface="+mn-ea"/>
+                <a:cs typeface="+mn-cs"/>
+              </a:rPr>
+              <a:t> CSS Tester</a:t>
+            </a:r>
+          </a:p>
+          <a:p>
+            <a:endParaRPr lang="en-US" sz="1200" kern="1200" baseline="0" dirty="0" smtClean="0">
+              <a:solidFill>
+                <a:schemeClr val="tx1"/>
+              </a:solidFill>
+              <a:effectLst/>
+              <a:latin typeface="+mn-lt"/>
+              <a:ea typeface="+mn-ea"/>
+              <a:cs typeface="+mn-cs"/>
+            </a:endParaRPr>
+          </a:p>
+          <a:p>
+            <a:r>
+              <a:rPr lang="en-US" sz="1200" kern="1200" dirty="0" smtClean="0">
+                <a:solidFill>
+                  <a:schemeClr val="tx1"/>
+                </a:solidFill>
+                <a:effectLst/>
+                <a:latin typeface="+mn-lt"/>
+                <a:ea typeface="+mn-ea"/>
+                <a:cs typeface="+mn-cs"/>
+              </a:rPr>
+              <a:t>https://chrome.google.com/webstore/detail/css-tester/pjncppaiejjkcjlcgegcbmhgkflhenfp?hl=en</a:t>
+            </a:r>
             <a:endParaRPr lang="en-US" sz="1200" kern="1200" dirty="0">
               <a:solidFill>
                 <a:schemeClr val="tx1"/>
@@ -1052,6 +1509,297 @@
           </a:bodyPr>
           <a:lstStyle/>
           <a:p>
+            <a:r>
+              <a:rPr lang="en-US" sz="1200" kern="1200" dirty="0" smtClean="0">
+                <a:solidFill>
+                  <a:schemeClr val="tx1"/>
+                </a:solidFill>
+                <a:effectLst/>
+                <a:latin typeface="+mn-lt"/>
+                <a:ea typeface="+mn-ea"/>
+                <a:cs typeface="+mn-cs"/>
+              </a:rPr>
+              <a:t>A cookie is a small</a:t>
+            </a:r>
+            <a:r>
+              <a:rPr lang="en-US" sz="1200" kern="1200" baseline="0" dirty="0" smtClean="0">
+                <a:solidFill>
+                  <a:schemeClr val="tx1"/>
+                </a:solidFill>
+                <a:effectLst/>
+                <a:latin typeface="+mn-lt"/>
+                <a:ea typeface="+mn-ea"/>
+                <a:cs typeface="+mn-cs"/>
+              </a:rPr>
+              <a:t> piece of data that the browser allows to be stored on the client.  </a:t>
+            </a:r>
+          </a:p>
+          <a:p>
+            <a:r>
+              <a:rPr lang="en-US" sz="1200" kern="1200" baseline="0" dirty="0" smtClean="0">
+                <a:solidFill>
+                  <a:schemeClr val="tx1"/>
+                </a:solidFill>
+                <a:effectLst/>
+                <a:latin typeface="+mn-lt"/>
+                <a:ea typeface="+mn-ea"/>
+                <a:cs typeface="+mn-cs"/>
+              </a:rPr>
+              <a:t>This is the only data (with a few exceptions) that the server can save to the clients computer and retrieve it.</a:t>
+            </a:r>
+          </a:p>
+          <a:p>
+            <a:endParaRPr lang="en-US" sz="1200" kern="1200" baseline="0" dirty="0" smtClean="0">
+              <a:solidFill>
+                <a:schemeClr val="tx1"/>
+              </a:solidFill>
+              <a:effectLst/>
+              <a:latin typeface="+mn-lt"/>
+              <a:ea typeface="+mn-ea"/>
+              <a:cs typeface="+mn-cs"/>
+            </a:endParaRPr>
+          </a:p>
+          <a:p>
+            <a:r>
+              <a:rPr lang="en-US" sz="1200" kern="1200" baseline="0" dirty="0" smtClean="0">
+                <a:solidFill>
+                  <a:schemeClr val="tx1"/>
+                </a:solidFill>
+                <a:effectLst/>
+                <a:latin typeface="+mn-lt"/>
+                <a:ea typeface="+mn-ea"/>
+                <a:cs typeface="+mn-cs"/>
+              </a:rPr>
+              <a:t>Cookies are part of the sandbox security model of the browser.  There have been a few exploits related to cookies.</a:t>
+            </a:r>
+          </a:p>
+          <a:p>
+            <a:endParaRPr lang="en-US" sz="1200" kern="1200" baseline="0" dirty="0" smtClean="0">
+              <a:solidFill>
+                <a:schemeClr val="tx1"/>
+              </a:solidFill>
+              <a:effectLst/>
+              <a:latin typeface="+mn-lt"/>
+              <a:ea typeface="+mn-ea"/>
+              <a:cs typeface="+mn-cs"/>
+            </a:endParaRPr>
+          </a:p>
+          <a:p>
+            <a:r>
+              <a:rPr lang="en-US" sz="1200" kern="1200" baseline="0" dirty="0" smtClean="0">
+                <a:solidFill>
+                  <a:schemeClr val="tx1"/>
+                </a:solidFill>
+                <a:effectLst/>
+                <a:latin typeface="+mn-lt"/>
+                <a:ea typeface="+mn-ea"/>
+                <a:cs typeface="+mn-cs"/>
+              </a:rPr>
+              <a:t>Cookies are designed to not be shared.  Only the host that set the cookie can retrieve it.</a:t>
+            </a:r>
+          </a:p>
+          <a:p>
+            <a:endParaRPr lang="en-US" sz="1200" kern="1200" baseline="0" dirty="0" smtClean="0">
+              <a:solidFill>
+                <a:schemeClr val="tx1"/>
+              </a:solidFill>
+              <a:effectLst/>
+              <a:latin typeface="+mn-lt"/>
+              <a:ea typeface="+mn-ea"/>
+              <a:cs typeface="+mn-cs"/>
+            </a:endParaRPr>
+          </a:p>
+          <a:p>
+            <a:r>
+              <a:rPr lang="en-US" sz="1200" kern="1200" baseline="0" dirty="0" smtClean="0">
+                <a:solidFill>
+                  <a:schemeClr val="tx1"/>
+                </a:solidFill>
+                <a:effectLst/>
+                <a:latin typeface="+mn-lt"/>
+                <a:ea typeface="+mn-ea"/>
+                <a:cs typeface="+mn-cs"/>
+              </a:rPr>
+              <a:t>Although sites – especially advertisers – like Google and </a:t>
+            </a:r>
+            <a:r>
+              <a:rPr lang="en-US" sz="1200" kern="1200" baseline="0" dirty="0" err="1" smtClean="0">
+                <a:solidFill>
+                  <a:schemeClr val="tx1"/>
+                </a:solidFill>
+                <a:effectLst/>
+                <a:latin typeface="+mn-lt"/>
+                <a:ea typeface="+mn-ea"/>
+                <a:cs typeface="+mn-cs"/>
+              </a:rPr>
+              <a:t>Facebook</a:t>
+            </a:r>
+            <a:r>
+              <a:rPr lang="en-US" sz="1200" kern="1200" baseline="0" dirty="0" smtClean="0">
+                <a:solidFill>
+                  <a:schemeClr val="tx1"/>
+                </a:solidFill>
+                <a:effectLst/>
+                <a:latin typeface="+mn-lt"/>
+                <a:ea typeface="+mn-ea"/>
+                <a:cs typeface="+mn-cs"/>
+              </a:rPr>
+              <a:t> – can share your cookie information.  So any page with Google </a:t>
+            </a:r>
+            <a:r>
+              <a:rPr lang="en-US" sz="1200" kern="1200" baseline="0" dirty="0" err="1" smtClean="0">
+                <a:solidFill>
+                  <a:schemeClr val="tx1"/>
+                </a:solidFill>
+                <a:effectLst/>
+                <a:latin typeface="+mn-lt"/>
+                <a:ea typeface="+mn-ea"/>
+                <a:cs typeface="+mn-cs"/>
+              </a:rPr>
+              <a:t>Adwords</a:t>
+            </a:r>
+            <a:r>
+              <a:rPr lang="en-US" sz="1200" kern="1200" baseline="0" dirty="0" smtClean="0">
+                <a:solidFill>
+                  <a:schemeClr val="tx1"/>
+                </a:solidFill>
+                <a:effectLst/>
+                <a:latin typeface="+mn-lt"/>
+                <a:ea typeface="+mn-ea"/>
+                <a:cs typeface="+mn-cs"/>
+              </a:rPr>
+              <a:t> or a </a:t>
+            </a:r>
+            <a:r>
+              <a:rPr lang="en-US" sz="1200" kern="1200" baseline="0" dirty="0" err="1" smtClean="0">
+                <a:solidFill>
+                  <a:schemeClr val="tx1"/>
+                </a:solidFill>
+                <a:effectLst/>
+                <a:latin typeface="+mn-lt"/>
+                <a:ea typeface="+mn-ea"/>
+                <a:cs typeface="+mn-cs"/>
+              </a:rPr>
+              <a:t>Facebook</a:t>
+            </a:r>
+            <a:r>
+              <a:rPr lang="en-US" sz="1200" kern="1200" baseline="0" dirty="0" smtClean="0">
+                <a:solidFill>
+                  <a:schemeClr val="tx1"/>
+                </a:solidFill>
+                <a:effectLst/>
+                <a:latin typeface="+mn-lt"/>
+                <a:ea typeface="+mn-ea"/>
+                <a:cs typeface="+mn-cs"/>
+              </a:rPr>
+              <a:t> “like” button can be tracked by them and they can build a history of sites you visit.</a:t>
+            </a:r>
+          </a:p>
+          <a:p>
+            <a:endParaRPr lang="en-US" sz="1200" kern="1200" baseline="0" dirty="0" smtClean="0">
+              <a:solidFill>
+                <a:schemeClr val="tx1"/>
+              </a:solidFill>
+              <a:effectLst/>
+              <a:latin typeface="+mn-lt"/>
+              <a:ea typeface="+mn-ea"/>
+              <a:cs typeface="+mn-cs"/>
+            </a:endParaRPr>
+          </a:p>
+          <a:p>
+            <a:r>
+              <a:rPr lang="en-US" sz="1200" kern="1200" baseline="0" dirty="0" smtClean="0">
+                <a:solidFill>
+                  <a:schemeClr val="tx1"/>
+                </a:solidFill>
+                <a:effectLst/>
+                <a:latin typeface="+mn-lt"/>
+                <a:ea typeface="+mn-ea"/>
+                <a:cs typeface="+mn-cs"/>
+              </a:rPr>
+              <a:t>A cookie is basically a name and a value, with a few other attributes such as expiration</a:t>
+            </a:r>
+          </a:p>
+        </p:txBody>
+      </p:sp>
+      <p:sp>
+        <p:nvSpPr>
+          <p:cNvPr id="4" name="Slide Number Placeholder 3"/>
+          <p:cNvSpPr>
+            <a:spLocks noGrp="1"/>
+          </p:cNvSpPr>
+          <p:nvPr>
+            <p:ph type="sldNum" sz="quarter" idx="10"/>
+          </p:nvPr>
+        </p:nvSpPr>
+        <p:spPr/>
+        <p:txBody>
+          <a:bodyPr/>
+          <a:lstStyle/>
+          <a:p>
+            <a:fld id="{2468E330-6F11-4EB8-9125-0BEE82D16730}" type="slidenum">
+              <a:rPr lang="en-US" smtClean="0"/>
+              <a:pPr/>
+              <a:t>7</a:t>
+            </a:fld>
+            <a:endParaRPr lang="en-US"/>
+          </a:p>
+        </p:txBody>
+      </p:sp>
+    </p:spTree>
+  </p:cSld>
+  <p:clrMapOvr>
+    <a:masterClrMapping/>
+  </p:clrMapOvr>
+</p:notes>
+</file>
+
+<file path=ppt/notesSlides/notesSlide8.xml><?xml version="1.0" encoding="utf-8"?>
+<p:notes xmlns:a="http://schemas.openxmlformats.org/drawingml/2006/main" xmlns:r="http://schemas.openxmlformats.org/officeDocument/2006/relationships" xmlns:p="http://schemas.openxmlformats.org/presentationml/2006/main">
+  <p:cSld>
+    <p:spTree>
+      <p:nvGrpSpPr>
+        <p:cNvPr id="1" name=""/>
+        <p:cNvGrpSpPr/>
+        <p:nvPr/>
+      </p:nvGrpSpPr>
+      <p:grpSpPr>
+        <a:xfrm>
+          <a:off x="0" y="0"/>
+          <a:ext cx="0" cy="0"/>
+          <a:chOff x="0" y="0"/>
+          <a:chExt cx="0" cy="0"/>
+        </a:xfrm>
+      </p:grpSpPr>
+      <p:sp>
+        <p:nvSpPr>
+          <p:cNvPr id="2" name="Slide Image Placeholder 1"/>
+          <p:cNvSpPr>
+            <a:spLocks noGrp="1" noRot="1" noChangeAspect="1"/>
+          </p:cNvSpPr>
+          <p:nvPr>
+            <p:ph type="sldImg"/>
+          </p:nvPr>
+        </p:nvSpPr>
+        <p:spPr/>
+      </p:sp>
+      <p:sp>
+        <p:nvSpPr>
+          <p:cNvPr id="3" name="Notes Placeholder 2"/>
+          <p:cNvSpPr>
+            <a:spLocks noGrp="1"/>
+          </p:cNvSpPr>
+          <p:nvPr>
+            <p:ph type="body" idx="1"/>
+          </p:nvPr>
+        </p:nvSpPr>
+        <p:spPr/>
+        <p:txBody>
+          <a:bodyPr>
+            <a:normAutofit/>
+          </a:bodyPr>
+          <a:lstStyle/>
+          <a:p>
             <a:endParaRPr lang="en-US" sz="1200" kern="1200" dirty="0">
               <a:solidFill>
                 <a:schemeClr val="tx1"/>
@@ -1082,7 +1830,97 @@
             <a:fld id="{2468E330-6F11-4EB8-9125-0BEE82D16730}" type="slidenum">
               <a:rPr lang="en-US" smtClean="0"/>
               <a:pPr/>
-              <a:t>7</a:t>
+              <a:t>8</a:t>
+            </a:fld>
+            <a:endParaRPr lang="en-US"/>
+          </a:p>
+        </p:txBody>
+      </p:sp>
+    </p:spTree>
+  </p:cSld>
+  <p:clrMapOvr>
+    <a:masterClrMapping/>
+  </p:clrMapOvr>
+</p:notes>
+</file>
+
+<file path=ppt/notesSlides/notesSlide9.xml><?xml version="1.0" encoding="utf-8"?>
+<p:notes xmlns:a="http://schemas.openxmlformats.org/drawingml/2006/main" xmlns:r="http://schemas.openxmlformats.org/officeDocument/2006/relationships" xmlns:p="http://schemas.openxmlformats.org/presentationml/2006/main">
+  <p:cSld>
+    <p:spTree>
+      <p:nvGrpSpPr>
+        <p:cNvPr id="1" name=""/>
+        <p:cNvGrpSpPr/>
+        <p:nvPr/>
+      </p:nvGrpSpPr>
+      <p:grpSpPr>
+        <a:xfrm>
+          <a:off x="0" y="0"/>
+          <a:ext cx="0" cy="0"/>
+          <a:chOff x="0" y="0"/>
+          <a:chExt cx="0" cy="0"/>
+        </a:xfrm>
+      </p:grpSpPr>
+      <p:sp>
+        <p:nvSpPr>
+          <p:cNvPr id="2" name="Slide Image Placeholder 1"/>
+          <p:cNvSpPr>
+            <a:spLocks noGrp="1" noRot="1" noChangeAspect="1"/>
+          </p:cNvSpPr>
+          <p:nvPr>
+            <p:ph type="sldImg"/>
+          </p:nvPr>
+        </p:nvSpPr>
+        <p:spPr/>
+      </p:sp>
+      <p:sp>
+        <p:nvSpPr>
+          <p:cNvPr id="3" name="Notes Placeholder 2"/>
+          <p:cNvSpPr>
+            <a:spLocks noGrp="1"/>
+          </p:cNvSpPr>
+          <p:nvPr>
+            <p:ph type="body" idx="1"/>
+          </p:nvPr>
+        </p:nvSpPr>
+        <p:spPr/>
+        <p:txBody>
+          <a:bodyPr>
+            <a:normAutofit/>
+          </a:bodyPr>
+          <a:lstStyle/>
+          <a:p>
+            <a:endParaRPr lang="en-US" sz="1200" kern="1200" baseline="0" dirty="0" smtClean="0">
+              <a:solidFill>
+                <a:schemeClr val="tx1"/>
+              </a:solidFill>
+              <a:effectLst/>
+              <a:latin typeface="+mn-lt"/>
+              <a:ea typeface="+mn-ea"/>
+              <a:cs typeface="+mn-cs"/>
+            </a:endParaRPr>
+          </a:p>
+        </p:txBody>
+      </p:sp>
+      <p:sp>
+        <p:nvSpPr>
+          <p:cNvPr id="4" name="Slide Number Placeholder 3"/>
+          <p:cNvSpPr>
+            <a:spLocks noGrp="1"/>
+          </p:cNvSpPr>
+          <p:nvPr>
+            <p:ph type="sldNum" sz="quarter" idx="10"/>
+          </p:nvPr>
+        </p:nvSpPr>
+        <p:spPr/>
+        <p:txBody>
+          <a:bodyPr/>
+          <a:lstStyle/>
+          <a:p>
+            <a:fld id="{2468E330-6F11-4EB8-9125-0BEE82D16730}" type="slidenum">
+              <a:rPr lang="en-US" smtClean="0"/>
+              <a:pPr/>
+              <a:t>9</a:t>
             </a:fld>
             <a:endParaRPr lang="en-US"/>
           </a:p>
@@ -1277,7 +2115,8 @@
           <a:p>
             <a:fld id="{6FAF76D1-06A1-4878-995B-DD4F41EEDC53}" type="datetimeFigureOut">
               <a:rPr lang="en-US" smtClean="0"/>
-              <a:t>3/8/2013</a:t>
+              <a:pPr/>
+              <a:t>3/9/2013</a:t>
             </a:fld>
             <a:endParaRPr lang="en-US"/>
           </a:p>
@@ -1319,6 +2158,7 @@
           <a:p>
             <a:fld id="{6288E32E-B502-4D4E-9A85-885C141E8333}" type="slidenum">
               <a:rPr lang="en-US" smtClean="0"/>
+              <a:pPr/>
               <a:t>‹#›</a:t>
             </a:fld>
             <a:endParaRPr lang="en-US"/>
@@ -1328,7 +2168,7 @@
     </p:spTree>
     <p:extLst>
       <p:ext uri="{BB962C8B-B14F-4D97-AF65-F5344CB8AC3E}">
-        <p14:creationId xmlns:p14="http://schemas.microsoft.com/office/powerpoint/2010/main" val="45077974"/>
+        <p14:creationId xmlns="" xmlns:p14="http://schemas.microsoft.com/office/powerpoint/2010/main" val="45077974"/>
       </p:ext>
     </p:extLst>
   </p:cSld>
@@ -1447,7 +2287,8 @@
           <a:p>
             <a:fld id="{6FAF76D1-06A1-4878-995B-DD4F41EEDC53}" type="datetimeFigureOut">
               <a:rPr lang="en-US" smtClean="0"/>
-              <a:t>3/8/2013</a:t>
+              <a:pPr/>
+              <a:t>3/9/2013</a:t>
             </a:fld>
             <a:endParaRPr lang="en-US"/>
           </a:p>
@@ -1489,6 +2330,7 @@
           <a:p>
             <a:fld id="{6288E32E-B502-4D4E-9A85-885C141E8333}" type="slidenum">
               <a:rPr lang="en-US" smtClean="0"/>
+              <a:pPr/>
               <a:t>‹#›</a:t>
             </a:fld>
             <a:endParaRPr lang="en-US"/>
@@ -1498,7 +2340,7 @@
     </p:spTree>
     <p:extLst>
       <p:ext uri="{BB962C8B-B14F-4D97-AF65-F5344CB8AC3E}">
-        <p14:creationId xmlns:p14="http://schemas.microsoft.com/office/powerpoint/2010/main" val="3768407640"/>
+        <p14:creationId xmlns="" xmlns:p14="http://schemas.microsoft.com/office/powerpoint/2010/main" val="3768407640"/>
       </p:ext>
     </p:extLst>
   </p:cSld>
@@ -1627,7 +2469,8 @@
           <a:p>
             <a:fld id="{6FAF76D1-06A1-4878-995B-DD4F41EEDC53}" type="datetimeFigureOut">
               <a:rPr lang="en-US" smtClean="0"/>
-              <a:t>3/8/2013</a:t>
+              <a:pPr/>
+              <a:t>3/9/2013</a:t>
             </a:fld>
             <a:endParaRPr lang="en-US"/>
           </a:p>
@@ -1669,6 +2512,7 @@
           <a:p>
             <a:fld id="{6288E32E-B502-4D4E-9A85-885C141E8333}" type="slidenum">
               <a:rPr lang="en-US" smtClean="0"/>
+              <a:pPr/>
               <a:t>‹#›</a:t>
             </a:fld>
             <a:endParaRPr lang="en-US"/>
@@ -1678,7 +2522,7 @@
     </p:spTree>
     <p:extLst>
       <p:ext uri="{BB962C8B-B14F-4D97-AF65-F5344CB8AC3E}">
-        <p14:creationId xmlns:p14="http://schemas.microsoft.com/office/powerpoint/2010/main" val="1458810807"/>
+        <p14:creationId xmlns="" xmlns:p14="http://schemas.microsoft.com/office/powerpoint/2010/main" val="1458810807"/>
       </p:ext>
     </p:extLst>
   </p:cSld>
@@ -1797,7 +2641,8 @@
           <a:p>
             <a:fld id="{6FAF76D1-06A1-4878-995B-DD4F41EEDC53}" type="datetimeFigureOut">
               <a:rPr lang="en-US" smtClean="0"/>
-              <a:t>3/8/2013</a:t>
+              <a:pPr/>
+              <a:t>3/9/2013</a:t>
             </a:fld>
             <a:endParaRPr lang="en-US"/>
           </a:p>
@@ -1839,6 +2684,7 @@
           <a:p>
             <a:fld id="{6288E32E-B502-4D4E-9A85-885C141E8333}" type="slidenum">
               <a:rPr lang="en-US" smtClean="0"/>
+              <a:pPr/>
               <a:t>‹#›</a:t>
             </a:fld>
             <a:endParaRPr lang="en-US"/>
@@ -1848,7 +2694,7 @@
     </p:spTree>
     <p:extLst>
       <p:ext uri="{BB962C8B-B14F-4D97-AF65-F5344CB8AC3E}">
-        <p14:creationId xmlns:p14="http://schemas.microsoft.com/office/powerpoint/2010/main" val="832050394"/>
+        <p14:creationId xmlns="" xmlns:p14="http://schemas.microsoft.com/office/powerpoint/2010/main" val="832050394"/>
       </p:ext>
     </p:extLst>
   </p:cSld>
@@ -2043,7 +2889,8 @@
           <a:p>
             <a:fld id="{6FAF76D1-06A1-4878-995B-DD4F41EEDC53}" type="datetimeFigureOut">
               <a:rPr lang="en-US" smtClean="0"/>
-              <a:t>3/8/2013</a:t>
+              <a:pPr/>
+              <a:t>3/9/2013</a:t>
             </a:fld>
             <a:endParaRPr lang="en-US"/>
           </a:p>
@@ -2085,6 +2932,7 @@
           <a:p>
             <a:fld id="{6288E32E-B502-4D4E-9A85-885C141E8333}" type="slidenum">
               <a:rPr lang="en-US" smtClean="0"/>
+              <a:pPr/>
               <a:t>‹#›</a:t>
             </a:fld>
             <a:endParaRPr lang="en-US"/>
@@ -2094,7 +2942,7 @@
     </p:spTree>
     <p:extLst>
       <p:ext uri="{BB962C8B-B14F-4D97-AF65-F5344CB8AC3E}">
-        <p14:creationId xmlns:p14="http://schemas.microsoft.com/office/powerpoint/2010/main" val="4137565780"/>
+        <p14:creationId xmlns="" xmlns:p14="http://schemas.microsoft.com/office/powerpoint/2010/main" val="4137565780"/>
       </p:ext>
     </p:extLst>
   </p:cSld>
@@ -2331,7 +3179,8 @@
           <a:p>
             <a:fld id="{6FAF76D1-06A1-4878-995B-DD4F41EEDC53}" type="datetimeFigureOut">
               <a:rPr lang="en-US" smtClean="0"/>
-              <a:t>3/8/2013</a:t>
+              <a:pPr/>
+              <a:t>3/9/2013</a:t>
             </a:fld>
             <a:endParaRPr lang="en-US"/>
           </a:p>
@@ -2373,6 +3222,7 @@
           <a:p>
             <a:fld id="{6288E32E-B502-4D4E-9A85-885C141E8333}" type="slidenum">
               <a:rPr lang="en-US" smtClean="0"/>
+              <a:pPr/>
               <a:t>‹#›</a:t>
             </a:fld>
             <a:endParaRPr lang="en-US"/>
@@ -2382,7 +3232,7 @@
     </p:spTree>
     <p:extLst>
       <p:ext uri="{BB962C8B-B14F-4D97-AF65-F5344CB8AC3E}">
-        <p14:creationId xmlns:p14="http://schemas.microsoft.com/office/powerpoint/2010/main" val="2737350807"/>
+        <p14:creationId xmlns="" xmlns:p14="http://schemas.microsoft.com/office/powerpoint/2010/main" val="2737350807"/>
       </p:ext>
     </p:extLst>
   </p:cSld>
@@ -2753,7 +3603,8 @@
           <a:p>
             <a:fld id="{6FAF76D1-06A1-4878-995B-DD4F41EEDC53}" type="datetimeFigureOut">
               <a:rPr lang="en-US" smtClean="0"/>
-              <a:t>3/8/2013</a:t>
+              <a:pPr/>
+              <a:t>3/9/2013</a:t>
             </a:fld>
             <a:endParaRPr lang="en-US"/>
           </a:p>
@@ -2795,6 +3646,7 @@
           <a:p>
             <a:fld id="{6288E32E-B502-4D4E-9A85-885C141E8333}" type="slidenum">
               <a:rPr lang="en-US" smtClean="0"/>
+              <a:pPr/>
               <a:t>‹#›</a:t>
             </a:fld>
             <a:endParaRPr lang="en-US"/>
@@ -2804,7 +3656,7 @@
     </p:spTree>
     <p:extLst>
       <p:ext uri="{BB962C8B-B14F-4D97-AF65-F5344CB8AC3E}">
-        <p14:creationId xmlns:p14="http://schemas.microsoft.com/office/powerpoint/2010/main" val="2305800940"/>
+        <p14:creationId xmlns="" xmlns:p14="http://schemas.microsoft.com/office/powerpoint/2010/main" val="2305800940"/>
       </p:ext>
     </p:extLst>
   </p:cSld>
@@ -2871,7 +3723,8 @@
           <a:p>
             <a:fld id="{6FAF76D1-06A1-4878-995B-DD4F41EEDC53}" type="datetimeFigureOut">
               <a:rPr lang="en-US" smtClean="0"/>
-              <a:t>3/8/2013</a:t>
+              <a:pPr/>
+              <a:t>3/9/2013</a:t>
             </a:fld>
             <a:endParaRPr lang="en-US"/>
           </a:p>
@@ -2913,6 +3766,7 @@
           <a:p>
             <a:fld id="{6288E32E-B502-4D4E-9A85-885C141E8333}" type="slidenum">
               <a:rPr lang="en-US" smtClean="0"/>
+              <a:pPr/>
               <a:t>‹#›</a:t>
             </a:fld>
             <a:endParaRPr lang="en-US"/>
@@ -2922,7 +3776,7 @@
     </p:spTree>
     <p:extLst>
       <p:ext uri="{BB962C8B-B14F-4D97-AF65-F5344CB8AC3E}">
-        <p14:creationId xmlns:p14="http://schemas.microsoft.com/office/powerpoint/2010/main" val="1950464239"/>
+        <p14:creationId xmlns="" xmlns:p14="http://schemas.microsoft.com/office/powerpoint/2010/main" val="1950464239"/>
       </p:ext>
     </p:extLst>
   </p:cSld>
@@ -2966,7 +3820,8 @@
           <a:p>
             <a:fld id="{6FAF76D1-06A1-4878-995B-DD4F41EEDC53}" type="datetimeFigureOut">
               <a:rPr lang="en-US" smtClean="0"/>
-              <a:t>3/8/2013</a:t>
+              <a:pPr/>
+              <a:t>3/9/2013</a:t>
             </a:fld>
             <a:endParaRPr lang="en-US"/>
           </a:p>
@@ -3008,6 +3863,7 @@
           <a:p>
             <a:fld id="{6288E32E-B502-4D4E-9A85-885C141E8333}" type="slidenum">
               <a:rPr lang="en-US" smtClean="0"/>
+              <a:pPr/>
               <a:t>‹#›</a:t>
             </a:fld>
             <a:endParaRPr lang="en-US"/>
@@ -3017,7 +3873,7 @@
     </p:spTree>
     <p:extLst>
       <p:ext uri="{BB962C8B-B14F-4D97-AF65-F5344CB8AC3E}">
-        <p14:creationId xmlns:p14="http://schemas.microsoft.com/office/powerpoint/2010/main" val="1459274387"/>
+        <p14:creationId xmlns="" xmlns:p14="http://schemas.microsoft.com/office/powerpoint/2010/main" val="1459274387"/>
       </p:ext>
     </p:extLst>
   </p:cSld>
@@ -3243,7 +4099,8 @@
           <a:p>
             <a:fld id="{6FAF76D1-06A1-4878-995B-DD4F41EEDC53}" type="datetimeFigureOut">
               <a:rPr lang="en-US" smtClean="0"/>
-              <a:t>3/8/2013</a:t>
+              <a:pPr/>
+              <a:t>3/9/2013</a:t>
             </a:fld>
             <a:endParaRPr lang="en-US"/>
           </a:p>
@@ -3285,6 +4142,7 @@
           <a:p>
             <a:fld id="{6288E32E-B502-4D4E-9A85-885C141E8333}" type="slidenum">
               <a:rPr lang="en-US" smtClean="0"/>
+              <a:pPr/>
               <a:t>‹#›</a:t>
             </a:fld>
             <a:endParaRPr lang="en-US"/>
@@ -3294,7 +4152,7 @@
     </p:spTree>
     <p:extLst>
       <p:ext uri="{BB962C8B-B14F-4D97-AF65-F5344CB8AC3E}">
-        <p14:creationId xmlns:p14="http://schemas.microsoft.com/office/powerpoint/2010/main" val="2291993030"/>
+        <p14:creationId xmlns="" xmlns:p14="http://schemas.microsoft.com/office/powerpoint/2010/main" val="2291993030"/>
       </p:ext>
     </p:extLst>
   </p:cSld>
@@ -3496,7 +4354,8 @@
           <a:p>
             <a:fld id="{6FAF76D1-06A1-4878-995B-DD4F41EEDC53}" type="datetimeFigureOut">
               <a:rPr lang="en-US" smtClean="0"/>
-              <a:t>3/8/2013</a:t>
+              <a:pPr/>
+              <a:t>3/9/2013</a:t>
             </a:fld>
             <a:endParaRPr lang="en-US"/>
           </a:p>
@@ -3538,6 +4397,7 @@
           <a:p>
             <a:fld id="{6288E32E-B502-4D4E-9A85-885C141E8333}" type="slidenum">
               <a:rPr lang="en-US" smtClean="0"/>
+              <a:pPr/>
               <a:t>‹#›</a:t>
             </a:fld>
             <a:endParaRPr lang="en-US"/>
@@ -3547,7 +4407,7 @@
     </p:spTree>
     <p:extLst>
       <p:ext uri="{BB962C8B-B14F-4D97-AF65-F5344CB8AC3E}">
-        <p14:creationId xmlns:p14="http://schemas.microsoft.com/office/powerpoint/2010/main" val="3199637283"/>
+        <p14:creationId xmlns="" xmlns:p14="http://schemas.microsoft.com/office/powerpoint/2010/main" val="3199637283"/>
       </p:ext>
     </p:extLst>
   </p:cSld>
@@ -3709,7 +4569,8 @@
           <a:p>
             <a:fld id="{6FAF76D1-06A1-4878-995B-DD4F41EEDC53}" type="datetimeFigureOut">
               <a:rPr lang="en-US" smtClean="0"/>
-              <a:t>3/8/2013</a:t>
+              <a:pPr/>
+              <a:t>3/9/2013</a:t>
             </a:fld>
             <a:endParaRPr lang="en-US"/>
           </a:p>
@@ -3787,6 +4648,7 @@
           <a:p>
             <a:fld id="{6288E32E-B502-4D4E-9A85-885C141E8333}" type="slidenum">
               <a:rPr lang="en-US" smtClean="0"/>
+              <a:pPr/>
               <a:t>‹#›</a:t>
             </a:fld>
             <a:endParaRPr lang="en-US"/>
@@ -3796,7 +4658,7 @@
     </p:spTree>
     <p:extLst>
       <p:ext uri="{BB962C8B-B14F-4D97-AF65-F5344CB8AC3E}">
-        <p14:creationId xmlns:p14="http://schemas.microsoft.com/office/powerpoint/2010/main" val="1832702352"/>
+        <p14:creationId xmlns="" xmlns:p14="http://schemas.microsoft.com/office/powerpoint/2010/main" val="1832702352"/>
       </p:ext>
     </p:extLst>
   </p:cSld>
@@ -4268,14 +5130,664 @@
               <a:rPr lang="en-US" sz="4800" dirty="0" smtClean="0"/>
               <a:t>Testing Web Applications</a:t>
             </a:r>
-            <a:endParaRPr lang="en-US" sz="4800" dirty="0" smtClean="0"/>
           </a:p>
         </p:txBody>
       </p:sp>
     </p:spTree>
     <p:extLst>
       <p:ext uri="{BB962C8B-B14F-4D97-AF65-F5344CB8AC3E}">
-        <p14:creationId xmlns:p14="http://schemas.microsoft.com/office/powerpoint/2010/main" val="2225840098"/>
+        <p14:creationId xmlns="" xmlns:p14="http://schemas.microsoft.com/office/powerpoint/2010/main" val="2225840098"/>
+      </p:ext>
+    </p:extLst>
+  </p:cSld>
+  <p:clrMapOvr>
+    <a:masterClrMapping/>
+  </p:clrMapOvr>
+  <p:timing>
+    <p:tnLst>
+      <p:par>
+        <p:cTn id="1" dur="indefinite" restart="never" nodeType="tmRoot"/>
+      </p:par>
+    </p:tnLst>
+  </p:timing>
+</p:sld>
+</file>
+
+<file path=ppt/slides/slide10.xml><?xml version="1.0" encoding="utf-8"?>
+<p:sld xmlns:a="http://schemas.openxmlformats.org/drawingml/2006/main" xmlns:r="http://schemas.openxmlformats.org/officeDocument/2006/relationships" xmlns:p="http://schemas.openxmlformats.org/presentationml/2006/main">
+  <p:cSld>
+    <p:spTree>
+      <p:nvGrpSpPr>
+        <p:cNvPr id="1" name=""/>
+        <p:cNvGrpSpPr/>
+        <p:nvPr/>
+      </p:nvGrpSpPr>
+      <p:grpSpPr>
+        <a:xfrm>
+          <a:off x="0" y="0"/>
+          <a:ext cx="0" cy="0"/>
+          <a:chOff x="0" y="0"/>
+          <a:chExt cx="0" cy="0"/>
+        </a:xfrm>
+      </p:grpSpPr>
+      <p:sp>
+        <p:nvSpPr>
+          <p:cNvPr id="4" name="Rectangle 3"/>
+          <p:cNvSpPr/>
+          <p:nvPr/>
+        </p:nvSpPr>
+        <p:spPr>
+          <a:xfrm>
+            <a:off x="0" y="6096000"/>
+            <a:ext cx="9144000" cy="762000"/>
+          </a:xfrm>
+          <a:prstGeom prst="rect">
+            <a:avLst/>
+          </a:prstGeom>
+          <a:solidFill>
+            <a:schemeClr val="tx1">
+              <a:lumMod val="85000"/>
+              <a:lumOff val="15000"/>
+            </a:schemeClr>
+          </a:solidFill>
+        </p:spPr>
+        <p:style>
+          <a:lnRef idx="2">
+            <a:schemeClr val="accent1">
+              <a:shade val="50000"/>
+            </a:schemeClr>
+          </a:lnRef>
+          <a:fillRef idx="1">
+            <a:schemeClr val="accent1"/>
+          </a:fillRef>
+          <a:effectRef idx="0">
+            <a:schemeClr val="accent1"/>
+          </a:effectRef>
+          <a:fontRef idx="minor">
+            <a:schemeClr val="lt1"/>
+          </a:fontRef>
+        </p:style>
+        <p:txBody>
+          <a:bodyPr rtlCol="0" anchor="ctr"/>
+          <a:lstStyle/>
+          <a:p>
+            <a:pPr algn="ctr"/>
+            <a:endParaRPr lang="en-US"/>
+          </a:p>
+        </p:txBody>
+      </p:sp>
+      <p:pic>
+        <p:nvPicPr>
+          <p:cNvPr id="1027" name="Picture 3"/>
+          <p:cNvPicPr>
+            <a:picLocks noChangeAspect="1" noChangeArrowheads="1"/>
+          </p:cNvPicPr>
+          <p:nvPr/>
+        </p:nvPicPr>
+        <p:blipFill>
+          <a:blip r:embed="rId3" cstate="print"/>
+          <a:srcRect/>
+          <a:stretch>
+            <a:fillRect/>
+          </a:stretch>
+        </p:blipFill>
+        <p:spPr bwMode="auto">
+          <a:xfrm>
+            <a:off x="228600" y="6248400"/>
+            <a:ext cx="1371600" cy="410346"/>
+          </a:xfrm>
+          <a:prstGeom prst="rect">
+            <a:avLst/>
+          </a:prstGeom>
+          <a:noFill/>
+          <a:ln w="9525">
+            <a:noFill/>
+            <a:miter lim="800000"/>
+            <a:headEnd/>
+            <a:tailEnd/>
+          </a:ln>
+          <a:effectLst/>
+        </p:spPr>
+      </p:pic>
+      <p:sp>
+        <p:nvSpPr>
+          <p:cNvPr id="10" name="TextBox 9"/>
+          <p:cNvSpPr txBox="1"/>
+          <p:nvPr/>
+        </p:nvSpPr>
+        <p:spPr>
+          <a:xfrm>
+            <a:off x="1905000" y="6324600"/>
+            <a:ext cx="4648200" cy="369332"/>
+          </a:xfrm>
+          <a:prstGeom prst="rect">
+            <a:avLst/>
+          </a:prstGeom>
+          <a:noFill/>
+        </p:spPr>
+        <p:txBody>
+          <a:bodyPr wrap="square" rtlCol="0">
+            <a:spAutoFit/>
+          </a:bodyPr>
+          <a:lstStyle/>
+          <a:p>
+            <a:pPr algn="ctr"/>
+            <a:r>
+              <a:rPr lang="en-US" dirty="0" smtClean="0">
+                <a:solidFill>
+                  <a:schemeClr val="bg1"/>
+                </a:solidFill>
+                <a:latin typeface="Verdana" pitchFamily="34" charset="0"/>
+                <a:ea typeface="Verdana" pitchFamily="34" charset="0"/>
+                <a:cs typeface="Verdana" pitchFamily="34" charset="0"/>
+              </a:rPr>
+              <a:t>Testing web applications</a:t>
+            </a:r>
+            <a:endParaRPr lang="en-US" dirty="0">
+              <a:solidFill>
+                <a:schemeClr val="bg1"/>
+              </a:solidFill>
+              <a:latin typeface="Verdana" pitchFamily="34" charset="0"/>
+              <a:ea typeface="Verdana" pitchFamily="34" charset="0"/>
+              <a:cs typeface="Verdana" pitchFamily="34" charset="0"/>
+            </a:endParaRPr>
+          </a:p>
+        </p:txBody>
+      </p:sp>
+      <p:pic>
+        <p:nvPicPr>
+          <p:cNvPr id="1033" name="Picture 9"/>
+          <p:cNvPicPr>
+            <a:picLocks noChangeAspect="1" noChangeArrowheads="1"/>
+          </p:cNvPicPr>
+          <p:nvPr/>
+        </p:nvPicPr>
+        <p:blipFill>
+          <a:blip r:embed="rId4" cstate="print"/>
+          <a:srcRect/>
+          <a:stretch>
+            <a:fillRect/>
+          </a:stretch>
+        </p:blipFill>
+        <p:spPr bwMode="auto">
+          <a:xfrm>
+            <a:off x="6934202" y="6248400"/>
+            <a:ext cx="1981195" cy="431239"/>
+          </a:xfrm>
+          <a:prstGeom prst="rect">
+            <a:avLst/>
+          </a:prstGeom>
+          <a:noFill/>
+          <a:ln w="9525">
+            <a:noFill/>
+            <a:miter lim="800000"/>
+            <a:headEnd/>
+            <a:tailEnd/>
+          </a:ln>
+          <a:effectLst/>
+        </p:spPr>
+      </p:pic>
+      <p:sp>
+        <p:nvSpPr>
+          <p:cNvPr id="18" name="TextBox 17"/>
+          <p:cNvSpPr txBox="1"/>
+          <p:nvPr/>
+        </p:nvSpPr>
+        <p:spPr>
+          <a:xfrm>
+            <a:off x="0" y="762000"/>
+            <a:ext cx="9144000" cy="830997"/>
+          </a:xfrm>
+          <a:prstGeom prst="rect">
+            <a:avLst/>
+          </a:prstGeom>
+          <a:noFill/>
+        </p:spPr>
+        <p:txBody>
+          <a:bodyPr wrap="square" rtlCol="0">
+            <a:spAutoFit/>
+          </a:bodyPr>
+          <a:lstStyle/>
+          <a:p>
+            <a:pPr algn="ctr"/>
+            <a:r>
+              <a:rPr lang="en-US" sz="4800" dirty="0" smtClean="0"/>
+              <a:t>Setting Cookies</a:t>
+            </a:r>
+          </a:p>
+        </p:txBody>
+      </p:sp>
+      <p:sp>
+        <p:nvSpPr>
+          <p:cNvPr id="8" name="TextBox 7"/>
+          <p:cNvSpPr txBox="1"/>
+          <p:nvPr/>
+        </p:nvSpPr>
+        <p:spPr>
+          <a:xfrm>
+            <a:off x="533400" y="1602893"/>
+            <a:ext cx="7772400" cy="4524315"/>
+          </a:xfrm>
+          <a:prstGeom prst="rect">
+            <a:avLst/>
+          </a:prstGeom>
+          <a:noFill/>
+        </p:spPr>
+        <p:txBody>
+          <a:bodyPr wrap="square" rtlCol="0">
+            <a:spAutoFit/>
+          </a:bodyPr>
+          <a:lstStyle/>
+          <a:p>
+            <a:r>
+              <a:rPr lang="en-US" sz="3600" dirty="0" smtClean="0"/>
+              <a:t>From the console</a:t>
+            </a:r>
+          </a:p>
+          <a:p>
+            <a:endParaRPr lang="en-US" sz="3600" dirty="0" smtClean="0"/>
+          </a:p>
+          <a:p>
+            <a:r>
+              <a:rPr lang="en-US" sz="3600" dirty="0" smtClean="0"/>
+              <a:t>From a browser plugin</a:t>
+            </a:r>
+          </a:p>
+          <a:p>
+            <a:r>
+              <a:rPr lang="en-US" sz="3600" dirty="0" smtClean="0"/>
+              <a:t>	</a:t>
+            </a:r>
+            <a:r>
+              <a:rPr lang="en-US" sz="2400" dirty="0" smtClean="0"/>
+              <a:t>Chrome: </a:t>
+            </a:r>
+          </a:p>
+          <a:p>
+            <a:r>
+              <a:rPr lang="en-US" sz="2400" dirty="0" smtClean="0"/>
+              <a:t>		Edit This Cookie </a:t>
+            </a:r>
+            <a:br>
+              <a:rPr lang="en-US" sz="2400" dirty="0" smtClean="0"/>
+            </a:br>
+            <a:r>
+              <a:rPr lang="en-US" sz="2400" dirty="0" smtClean="0"/>
+              <a:t>		</a:t>
+            </a:r>
+            <a:r>
+              <a:rPr lang="en-US" sz="2400" dirty="0" err="1" smtClean="0"/>
+              <a:t>ChocoChip</a:t>
+            </a:r>
+            <a:r>
+              <a:rPr lang="en-US" sz="2400" dirty="0" smtClean="0"/>
+              <a:t> - Cookie Manager</a:t>
+            </a:r>
+          </a:p>
+          <a:p>
+            <a:endParaRPr lang="en-US" sz="2400" dirty="0" smtClean="0"/>
+          </a:p>
+          <a:p>
+            <a:endParaRPr lang="en-US" sz="3600" dirty="0" smtClean="0"/>
+          </a:p>
+          <a:p>
+            <a:pPr marL="914400" lvl="1" indent="-457200">
+              <a:buFont typeface="Calibri" pitchFamily="34" charset="0"/>
+              <a:buChar char="›"/>
+            </a:pPr>
+            <a:endParaRPr lang="en-US" sz="3600" dirty="0" smtClean="0"/>
+          </a:p>
+        </p:txBody>
+      </p:sp>
+    </p:spTree>
+    <p:extLst>
+      <p:ext uri="{BB962C8B-B14F-4D97-AF65-F5344CB8AC3E}">
+        <p14:creationId xmlns="" xmlns:p14="http://schemas.microsoft.com/office/powerpoint/2010/main" val="535094417"/>
+      </p:ext>
+    </p:extLst>
+  </p:cSld>
+  <p:clrMapOvr>
+    <a:masterClrMapping/>
+  </p:clrMapOvr>
+  <p:timing>
+    <p:tnLst>
+      <p:par>
+        <p:cTn id="1" dur="indefinite" restart="never" nodeType="tmRoot"/>
+      </p:par>
+    </p:tnLst>
+  </p:timing>
+</p:sld>
+</file>
+
+<file path=ppt/slides/slide11.xml><?xml version="1.0" encoding="utf-8"?>
+<p:sld xmlns:a="http://schemas.openxmlformats.org/drawingml/2006/main" xmlns:r="http://schemas.openxmlformats.org/officeDocument/2006/relationships" xmlns:p="http://schemas.openxmlformats.org/presentationml/2006/main">
+  <p:cSld>
+    <p:spTree>
+      <p:nvGrpSpPr>
+        <p:cNvPr id="1" name=""/>
+        <p:cNvGrpSpPr/>
+        <p:nvPr/>
+      </p:nvGrpSpPr>
+      <p:grpSpPr>
+        <a:xfrm>
+          <a:off x="0" y="0"/>
+          <a:ext cx="0" cy="0"/>
+          <a:chOff x="0" y="0"/>
+          <a:chExt cx="0" cy="0"/>
+        </a:xfrm>
+      </p:grpSpPr>
+      <p:sp>
+        <p:nvSpPr>
+          <p:cNvPr id="4" name="Rectangle 3"/>
+          <p:cNvSpPr/>
+          <p:nvPr/>
+        </p:nvSpPr>
+        <p:spPr>
+          <a:xfrm>
+            <a:off x="0" y="6096000"/>
+            <a:ext cx="9144000" cy="762000"/>
+          </a:xfrm>
+          <a:prstGeom prst="rect">
+            <a:avLst/>
+          </a:prstGeom>
+          <a:solidFill>
+            <a:schemeClr val="tx1">
+              <a:lumMod val="85000"/>
+              <a:lumOff val="15000"/>
+            </a:schemeClr>
+          </a:solidFill>
+        </p:spPr>
+        <p:style>
+          <a:lnRef idx="2">
+            <a:schemeClr val="accent1">
+              <a:shade val="50000"/>
+            </a:schemeClr>
+          </a:lnRef>
+          <a:fillRef idx="1">
+            <a:schemeClr val="accent1"/>
+          </a:fillRef>
+          <a:effectRef idx="0">
+            <a:schemeClr val="accent1"/>
+          </a:effectRef>
+          <a:fontRef idx="minor">
+            <a:schemeClr val="lt1"/>
+          </a:fontRef>
+        </p:style>
+        <p:txBody>
+          <a:bodyPr rtlCol="0" anchor="ctr"/>
+          <a:lstStyle/>
+          <a:p>
+            <a:pPr algn="ctr"/>
+            <a:endParaRPr lang="en-US"/>
+          </a:p>
+        </p:txBody>
+      </p:sp>
+      <p:pic>
+        <p:nvPicPr>
+          <p:cNvPr id="1027" name="Picture 3"/>
+          <p:cNvPicPr>
+            <a:picLocks noChangeAspect="1" noChangeArrowheads="1"/>
+          </p:cNvPicPr>
+          <p:nvPr/>
+        </p:nvPicPr>
+        <p:blipFill>
+          <a:blip r:embed="rId3" cstate="print"/>
+          <a:srcRect/>
+          <a:stretch>
+            <a:fillRect/>
+          </a:stretch>
+        </p:blipFill>
+        <p:spPr bwMode="auto">
+          <a:xfrm>
+            <a:off x="228600" y="6248400"/>
+            <a:ext cx="1371600" cy="410346"/>
+          </a:xfrm>
+          <a:prstGeom prst="rect">
+            <a:avLst/>
+          </a:prstGeom>
+          <a:noFill/>
+          <a:ln w="9525">
+            <a:noFill/>
+            <a:miter lim="800000"/>
+            <a:headEnd/>
+            <a:tailEnd/>
+          </a:ln>
+          <a:effectLst/>
+        </p:spPr>
+      </p:pic>
+      <p:sp>
+        <p:nvSpPr>
+          <p:cNvPr id="10" name="TextBox 9"/>
+          <p:cNvSpPr txBox="1"/>
+          <p:nvPr/>
+        </p:nvSpPr>
+        <p:spPr>
+          <a:xfrm>
+            <a:off x="1905000" y="6324600"/>
+            <a:ext cx="4648200" cy="369332"/>
+          </a:xfrm>
+          <a:prstGeom prst="rect">
+            <a:avLst/>
+          </a:prstGeom>
+          <a:noFill/>
+        </p:spPr>
+        <p:txBody>
+          <a:bodyPr wrap="square" rtlCol="0">
+            <a:spAutoFit/>
+          </a:bodyPr>
+          <a:lstStyle/>
+          <a:p>
+            <a:pPr algn="ctr"/>
+            <a:r>
+              <a:rPr lang="en-US" dirty="0" smtClean="0">
+                <a:solidFill>
+                  <a:schemeClr val="bg1"/>
+                </a:solidFill>
+                <a:latin typeface="Verdana" pitchFamily="34" charset="0"/>
+                <a:ea typeface="Verdana" pitchFamily="34" charset="0"/>
+                <a:cs typeface="Verdana" pitchFamily="34" charset="0"/>
+              </a:rPr>
+              <a:t>Testing web applications</a:t>
+            </a:r>
+            <a:endParaRPr lang="en-US" dirty="0">
+              <a:solidFill>
+                <a:schemeClr val="bg1"/>
+              </a:solidFill>
+              <a:latin typeface="Verdana" pitchFamily="34" charset="0"/>
+              <a:ea typeface="Verdana" pitchFamily="34" charset="0"/>
+              <a:cs typeface="Verdana" pitchFamily="34" charset="0"/>
+            </a:endParaRPr>
+          </a:p>
+        </p:txBody>
+      </p:sp>
+      <p:pic>
+        <p:nvPicPr>
+          <p:cNvPr id="1033" name="Picture 9"/>
+          <p:cNvPicPr>
+            <a:picLocks noChangeAspect="1" noChangeArrowheads="1"/>
+          </p:cNvPicPr>
+          <p:nvPr/>
+        </p:nvPicPr>
+        <p:blipFill>
+          <a:blip r:embed="rId4" cstate="print"/>
+          <a:srcRect/>
+          <a:stretch>
+            <a:fillRect/>
+          </a:stretch>
+        </p:blipFill>
+        <p:spPr bwMode="auto">
+          <a:xfrm>
+            <a:off x="6934202" y="6248400"/>
+            <a:ext cx="1981195" cy="431239"/>
+          </a:xfrm>
+          <a:prstGeom prst="rect">
+            <a:avLst/>
+          </a:prstGeom>
+          <a:noFill/>
+          <a:ln w="9525">
+            <a:noFill/>
+            <a:miter lim="800000"/>
+            <a:headEnd/>
+            <a:tailEnd/>
+          </a:ln>
+          <a:effectLst/>
+        </p:spPr>
+      </p:pic>
+      <p:sp>
+        <p:nvSpPr>
+          <p:cNvPr id="18" name="TextBox 17"/>
+          <p:cNvSpPr txBox="1"/>
+          <p:nvPr/>
+        </p:nvSpPr>
+        <p:spPr>
+          <a:xfrm>
+            <a:off x="0" y="762000"/>
+            <a:ext cx="9144000" cy="830997"/>
+          </a:xfrm>
+          <a:prstGeom prst="rect">
+            <a:avLst/>
+          </a:prstGeom>
+          <a:noFill/>
+        </p:spPr>
+        <p:txBody>
+          <a:bodyPr wrap="square" rtlCol="0">
+            <a:spAutoFit/>
+          </a:bodyPr>
+          <a:lstStyle/>
+          <a:p>
+            <a:pPr algn="ctr"/>
+            <a:r>
+              <a:rPr lang="en-US" sz="4800" dirty="0" smtClean="0"/>
+              <a:t>Testing the locale</a:t>
+            </a:r>
+          </a:p>
+        </p:txBody>
+      </p:sp>
+      <p:sp>
+        <p:nvSpPr>
+          <p:cNvPr id="9" name="Rectangle 8"/>
+          <p:cNvSpPr/>
+          <p:nvPr/>
+        </p:nvSpPr>
+        <p:spPr>
+          <a:xfrm>
+            <a:off x="4453217" y="3244334"/>
+            <a:ext cx="237566" cy="369332"/>
+          </a:xfrm>
+          <a:prstGeom prst="rect">
+            <a:avLst/>
+          </a:prstGeom>
+        </p:spPr>
+        <p:txBody>
+          <a:bodyPr wrap="none">
+            <a:spAutoFit/>
+          </a:bodyPr>
+          <a:lstStyle/>
+          <a:p>
+            <a:r>
+              <a:rPr lang="en-US" dirty="0" smtClean="0"/>
+              <a:t> </a:t>
+            </a:r>
+            <a:endParaRPr lang="en-US" dirty="0"/>
+          </a:p>
+        </p:txBody>
+      </p:sp>
+      <p:sp>
+        <p:nvSpPr>
+          <p:cNvPr id="8" name="TextBox 7"/>
+          <p:cNvSpPr txBox="1"/>
+          <p:nvPr/>
+        </p:nvSpPr>
+        <p:spPr>
+          <a:xfrm>
+            <a:off x="533400" y="1828799"/>
+            <a:ext cx="7772400" cy="3600986"/>
+          </a:xfrm>
+          <a:prstGeom prst="rect">
+            <a:avLst/>
+          </a:prstGeom>
+          <a:noFill/>
+        </p:spPr>
+        <p:txBody>
+          <a:bodyPr wrap="square" rtlCol="0">
+            <a:spAutoFit/>
+          </a:bodyPr>
+          <a:lstStyle/>
+          <a:p>
+            <a:r>
+              <a:rPr lang="en-US" sz="3600" dirty="0" smtClean="0"/>
+              <a:t>Change locale in Control </a:t>
+            </a:r>
+            <a:r>
+              <a:rPr lang="en-US" sz="3600" dirty="0" smtClean="0"/>
+              <a:t>Panel</a:t>
+            </a:r>
+            <a:endParaRPr lang="en-US" sz="3600" dirty="0" smtClean="0"/>
+          </a:p>
+          <a:p>
+            <a:r>
+              <a:rPr lang="en-US" sz="3600" dirty="0" smtClean="0"/>
+              <a:t>Change HTTP Header</a:t>
+            </a:r>
+          </a:p>
+          <a:p>
+            <a:r>
+              <a:rPr lang="en-US" sz="2400" dirty="0" smtClean="0"/>
+              <a:t>	Accept-language: </a:t>
+            </a:r>
+            <a:r>
+              <a:rPr lang="en-US" sz="2400" dirty="0" err="1" smtClean="0"/>
+              <a:t>en_US</a:t>
+            </a:r>
+            <a:r>
+              <a:rPr lang="en-US" sz="2400" dirty="0" smtClean="0"/>
+              <a:t>; q=-</a:t>
+            </a:r>
+            <a:r>
+              <a:rPr lang="en-US" sz="2400" dirty="0" smtClean="0"/>
+              <a:t>0.5</a:t>
+            </a:r>
+            <a:endParaRPr lang="en-US" sz="2400" dirty="0" smtClean="0"/>
+          </a:p>
+          <a:p>
+            <a:r>
+              <a:rPr lang="en-US" sz="3600" dirty="0" smtClean="0"/>
+              <a:t>Browser settings</a:t>
+            </a:r>
+          </a:p>
+          <a:p>
+            <a:r>
+              <a:rPr lang="en-US" sz="3600" dirty="0" smtClean="0"/>
+              <a:t>	</a:t>
+            </a:r>
+            <a:r>
+              <a:rPr lang="en-US" sz="2400" dirty="0" smtClean="0"/>
+              <a:t>IE Settings</a:t>
+            </a:r>
+          </a:p>
+          <a:p>
+            <a:r>
+              <a:rPr lang="en-US" sz="2400" dirty="0" smtClean="0"/>
+              <a:t>	chrome</a:t>
+            </a:r>
+            <a:r>
+              <a:rPr lang="en-US" sz="2400" dirty="0" smtClean="0"/>
+              <a:t>://settings/languages</a:t>
+            </a:r>
+          </a:p>
+          <a:p>
+            <a:r>
+              <a:rPr lang="en-US" sz="3600" smtClean="0"/>
+              <a:t>Browser Plugin</a:t>
+            </a:r>
+            <a:endParaRPr lang="en-US" sz="3600" dirty="0" smtClean="0"/>
+          </a:p>
+        </p:txBody>
+      </p:sp>
+    </p:spTree>
+    <p:extLst>
+      <p:ext uri="{BB962C8B-B14F-4D97-AF65-F5344CB8AC3E}">
+        <p14:creationId xmlns="" xmlns:p14="http://schemas.microsoft.com/office/powerpoint/2010/main" val="535094417"/>
       </p:ext>
     </p:extLst>
   </p:cSld>
@@ -4493,7 +6005,6 @@
               <a:rPr lang="en-US" sz="4800" dirty="0" smtClean="0"/>
               <a:t>What’s in a web app?</a:t>
             </a:r>
-            <a:endParaRPr lang="en-US" sz="4800" dirty="0" smtClean="0"/>
           </a:p>
         </p:txBody>
       </p:sp>
@@ -4689,7 +6200,7 @@
     </p:spTree>
     <p:extLst>
       <p:ext uri="{BB962C8B-B14F-4D97-AF65-F5344CB8AC3E}">
-        <p14:creationId xmlns:p14="http://schemas.microsoft.com/office/powerpoint/2010/main" val="3062231615"/>
+        <p14:creationId xmlns="" xmlns:p14="http://schemas.microsoft.com/office/powerpoint/2010/main" val="3062231615"/>
       </p:ext>
     </p:extLst>
   </p:cSld>
@@ -4905,9 +6416,8 @@
             <a:pPr algn="ctr"/>
             <a:r>
               <a:rPr lang="en-US" sz="4800" dirty="0" smtClean="0"/>
-              <a:t>How can we test the HTML</a:t>
-            </a:r>
-            <a:endParaRPr lang="en-US" sz="4800" dirty="0" smtClean="0"/>
+              <a:t>How can we test HTML?</a:t>
+            </a:r>
           </a:p>
         </p:txBody>
       </p:sp>
@@ -4920,7 +6430,7 @@
         <p:spPr>
           <a:xfrm>
             <a:off x="228600" y="1905000"/>
-            <a:ext cx="8686797" cy="1569660"/>
+            <a:ext cx="8686797" cy="3785652"/>
           </a:xfrm>
           <a:prstGeom prst="rect">
             <a:avLst/>
@@ -4934,23 +6444,59 @@
           <a:lstStyle/>
           <a:p>
             <a:r>
-              <a:rPr lang="en-US" sz="4800" dirty="0" smtClean="0"/>
+              <a:rPr lang="en-US" sz="3600" dirty="0" smtClean="0"/>
+              <a:t>Rendering (how it looks)</a:t>
+            </a:r>
+          </a:p>
+          <a:p>
+            <a:r>
+              <a:rPr lang="en-US" sz="3600" dirty="0" smtClean="0"/>
               <a:t>View Source</a:t>
             </a:r>
           </a:p>
           <a:p>
             <a:r>
-              <a:rPr lang="en-US" sz="4800" dirty="0" smtClean="0"/>
-              <a:t>Rendering</a:t>
-            </a:r>
-            <a:endParaRPr lang="en-US" sz="4800" dirty="0" smtClean="0"/>
+              <a:rPr lang="en-US" sz="3600" dirty="0" smtClean="0"/>
+              <a:t>HTML </a:t>
+            </a:r>
+            <a:r>
+              <a:rPr lang="en-US" sz="3600" dirty="0" err="1" smtClean="0"/>
+              <a:t>validator</a:t>
+            </a:r>
+            <a:endParaRPr lang="en-US" sz="3600" dirty="0" smtClean="0"/>
+          </a:p>
+          <a:p>
+            <a:r>
+              <a:rPr lang="en-US" sz="2400" dirty="0" smtClean="0"/>
+              <a:t>	 http://validator.w3.org/</a:t>
+            </a:r>
+            <a:endParaRPr lang="en-US" sz="3600" dirty="0" smtClean="0"/>
+          </a:p>
+          <a:p>
+            <a:r>
+              <a:rPr lang="en-US" sz="3600" dirty="0" err="1" smtClean="0"/>
+              <a:t>Plugins</a:t>
+            </a:r>
+            <a:endParaRPr lang="en-US" sz="3600" dirty="0" smtClean="0"/>
+          </a:p>
+          <a:p>
+            <a:r>
+              <a:rPr lang="en-US" sz="3600" dirty="0" smtClean="0"/>
+              <a:t>Cross-Browser</a:t>
+            </a:r>
+          </a:p>
+          <a:p>
+            <a:r>
+              <a:rPr lang="en-US" sz="3600" dirty="0" smtClean="0"/>
+              <a:t>Media (screen, print, projection)</a:t>
+            </a:r>
           </a:p>
         </p:txBody>
       </p:sp>
     </p:spTree>
     <p:extLst>
       <p:ext uri="{BB962C8B-B14F-4D97-AF65-F5344CB8AC3E}">
-        <p14:creationId xmlns:p14="http://schemas.microsoft.com/office/powerpoint/2010/main" val="1271748606"/>
+        <p14:creationId xmlns="" xmlns:p14="http://schemas.microsoft.com/office/powerpoint/2010/main" val="1271748606"/>
       </p:ext>
     </p:extLst>
   </p:cSld>
@@ -5166,16 +6712,68 @@
             <a:pPr algn="ctr"/>
             <a:r>
               <a:rPr lang="en-US" sz="4800" dirty="0" smtClean="0"/>
-              <a:t>CSS</a:t>
-            </a:r>
-            <a:endParaRPr lang="en-US" sz="4800" dirty="0" smtClean="0"/>
+              <a:t>Browser tools</a:t>
+            </a:r>
+          </a:p>
+        </p:txBody>
+      </p:sp>
+      <p:sp>
+        <p:nvSpPr>
+          <p:cNvPr id="8" name="TextBox 7"/>
+          <p:cNvSpPr txBox="1"/>
+          <p:nvPr/>
+        </p:nvSpPr>
+        <p:spPr>
+          <a:xfrm>
+            <a:off x="533400" y="1602893"/>
+            <a:ext cx="7772400" cy="2862322"/>
+          </a:xfrm>
+          <a:prstGeom prst="rect">
+            <a:avLst/>
+          </a:prstGeom>
+          <a:noFill/>
+        </p:spPr>
+        <p:txBody>
+          <a:bodyPr wrap="square" rtlCol="0">
+            <a:spAutoFit/>
+          </a:bodyPr>
+          <a:lstStyle/>
+          <a:p>
+            <a:r>
+              <a:rPr lang="en-US" sz="3600" dirty="0" smtClean="0"/>
+              <a:t>Chrome: Developer tools (built in), Firebug </a:t>
+            </a:r>
+            <a:r>
+              <a:rPr lang="en-US" sz="3600" dirty="0" err="1" smtClean="0"/>
+              <a:t>Lite</a:t>
+            </a:r>
+            <a:endParaRPr lang="en-US" sz="3600" dirty="0" smtClean="0"/>
+          </a:p>
+          <a:p>
+            <a:r>
+              <a:rPr lang="en-US" sz="3600" dirty="0" smtClean="0"/>
+              <a:t>Firefox: Firebug (plugin)</a:t>
+            </a:r>
+          </a:p>
+          <a:p>
+            <a:r>
+              <a:rPr lang="en-US" sz="3600" dirty="0" smtClean="0"/>
+              <a:t>IE: F12</a:t>
+            </a:r>
+          </a:p>
+          <a:p>
+            <a:pPr marL="914400" lvl="1" indent="-457200">
+              <a:buFont typeface="Calibri" pitchFamily="34" charset="0"/>
+              <a:buChar char="›"/>
+            </a:pPr>
+            <a:endParaRPr lang="en-US" sz="3600" dirty="0" smtClean="0"/>
           </a:p>
         </p:txBody>
       </p:sp>
     </p:spTree>
     <p:extLst>
       <p:ext uri="{BB962C8B-B14F-4D97-AF65-F5344CB8AC3E}">
-        <p14:creationId xmlns:p14="http://schemas.microsoft.com/office/powerpoint/2010/main" val="1710283614"/>
+        <p14:creationId xmlns="" xmlns:p14="http://schemas.microsoft.com/office/powerpoint/2010/main" val="535094417"/>
       </p:ext>
     </p:extLst>
   </p:cSld>
@@ -5391,16 +6989,103 @@
             <a:pPr algn="ctr"/>
             <a:r>
               <a:rPr lang="en-US" sz="4800" dirty="0" smtClean="0"/>
-              <a:t>JavaScript</a:t>
-            </a:r>
-            <a:endParaRPr lang="en-US" sz="4800" dirty="0" smtClean="0"/>
+              <a:t>How can we test CSS?</a:t>
+            </a:r>
+          </a:p>
+        </p:txBody>
+      </p:sp>
+      <p:sp>
+        <p:nvSpPr>
+          <p:cNvPr id="7" name="TextBox 6"/>
+          <p:cNvSpPr txBox="1"/>
+          <p:nvPr/>
+        </p:nvSpPr>
+        <p:spPr>
+          <a:xfrm>
+            <a:off x="228600" y="1905000"/>
+            <a:ext cx="8686797" cy="4339650"/>
+          </a:xfrm>
+          <a:prstGeom prst="rect">
+            <a:avLst/>
+          </a:prstGeom>
+          <a:noFill/>
+        </p:spPr>
+        <p:txBody>
+          <a:bodyPr wrap="square" rtlCol="0">
+            <a:spAutoFit/>
+          </a:bodyPr>
+          <a:lstStyle/>
+          <a:p>
+            <a:r>
+              <a:rPr lang="en-US" sz="3600" dirty="0" smtClean="0"/>
+              <a:t>Visually</a:t>
+            </a:r>
+          </a:p>
+          <a:p>
+            <a:r>
+              <a:rPr lang="en-US" sz="3600" dirty="0" smtClean="0"/>
+              <a:t>View Source	</a:t>
+            </a:r>
+          </a:p>
+          <a:p>
+            <a:r>
+              <a:rPr lang="en-US" sz="3600" dirty="0" smtClean="0"/>
+              <a:t>CSS </a:t>
+            </a:r>
+            <a:r>
+              <a:rPr lang="en-US" sz="3600" dirty="0" err="1" smtClean="0"/>
+              <a:t>validator</a:t>
+            </a:r>
+            <a:endParaRPr lang="en-US" sz="3600" dirty="0" smtClean="0"/>
+          </a:p>
+          <a:p>
+            <a:r>
+              <a:rPr lang="en-US" sz="3600" dirty="0" smtClean="0"/>
+              <a:t>	 </a:t>
+            </a:r>
+            <a:r>
+              <a:rPr lang="en-US" sz="2400" dirty="0" smtClean="0">
+                <a:hlinkClick r:id="rId5"/>
+              </a:rPr>
+              <a:t>http://jigsaw.w3.org/css-validator/</a:t>
+            </a:r>
+            <a:endParaRPr lang="en-US" sz="2400" dirty="0" smtClean="0"/>
+          </a:p>
+          <a:p>
+            <a:r>
+              <a:rPr lang="en-US" sz="2400" dirty="0" smtClean="0"/>
+              <a:t>	</a:t>
+            </a:r>
+            <a:r>
+              <a:rPr lang="en-US" sz="2400" dirty="0" smtClean="0">
+                <a:hlinkClick r:id="rId6"/>
+              </a:rPr>
+              <a:t>http://www.htmlhelp.com/cgi-bin/csscheck.cgi</a:t>
+            </a:r>
+            <a:endParaRPr lang="en-US" sz="2400" dirty="0" smtClean="0"/>
+          </a:p>
+          <a:p>
+            <a:r>
+              <a:rPr lang="en-US" sz="3600" dirty="0" smtClean="0"/>
+              <a:t>CSS Tester plugin </a:t>
+            </a:r>
+            <a:r>
+              <a:rPr lang="en-US" sz="2400" dirty="0" smtClean="0">
+                <a:hlinkClick r:id="rId7"/>
+              </a:rPr>
+              <a:t>https://chrome.google.com/webstore/detail/css-tester/pjncppaiejjkcjlcgegcbmhgkflhenfp?hl=en</a:t>
+            </a:r>
+            <a:endParaRPr lang="en-US" sz="2400" dirty="0" smtClean="0"/>
+          </a:p>
+          <a:p>
+            <a:endParaRPr lang="en-US" sz="2400" dirty="0" smtClean="0"/>
           </a:p>
         </p:txBody>
       </p:sp>
     </p:spTree>
     <p:extLst>
       <p:ext uri="{BB962C8B-B14F-4D97-AF65-F5344CB8AC3E}">
-        <p14:creationId xmlns:p14="http://schemas.microsoft.com/office/powerpoint/2010/main" val="1710283614"/>
+        <p14:creationId xmlns="" xmlns:p14="http://schemas.microsoft.com/office/powerpoint/2010/main" val="1710283614"/>
       </p:ext>
     </p:extLst>
   </p:cSld>
@@ -5616,104 +7301,15 @@
             <a:pPr algn="ctr"/>
             <a:r>
               <a:rPr lang="en-US" sz="4800" dirty="0" smtClean="0"/>
-              <a:t>Testing cookies</a:t>
-            </a:r>
-            <a:endParaRPr lang="en-US" sz="4800" dirty="0" smtClean="0"/>
-          </a:p>
-        </p:txBody>
-      </p:sp>
-      <p:sp>
-        <p:nvSpPr>
-          <p:cNvPr id="8" name="TextBox 7"/>
-          <p:cNvSpPr txBox="1"/>
-          <p:nvPr/>
-        </p:nvSpPr>
-        <p:spPr>
-          <a:xfrm>
-            <a:off x="533400" y="1602893"/>
-            <a:ext cx="7772400" cy="3416320"/>
-          </a:xfrm>
-          <a:prstGeom prst="rect">
-            <a:avLst/>
-          </a:prstGeom>
-          <a:noFill/>
-        </p:spPr>
-        <p:txBody>
-          <a:bodyPr wrap="square" rtlCol="0">
-            <a:spAutoFit/>
-          </a:bodyPr>
-          <a:lstStyle/>
-          <a:p>
-            <a:pPr marL="457200" indent="-457200">
-              <a:buFont typeface="Calibri" pitchFamily="34" charset="0"/>
-              <a:buChar char="›"/>
-            </a:pPr>
-            <a:r>
-              <a:rPr lang="en-US" sz="3600" dirty="0" smtClean="0"/>
-              <a:t>Verify behavior</a:t>
-            </a:r>
-          </a:p>
-          <a:p>
-            <a:pPr marL="457200" indent="-457200">
-              <a:buFont typeface="Calibri" pitchFamily="34" charset="0"/>
-              <a:buChar char="›"/>
-            </a:pPr>
-            <a:r>
-              <a:rPr lang="en-US" sz="3600" dirty="0" smtClean="0"/>
-              <a:t>View cookies</a:t>
-            </a:r>
-          </a:p>
-          <a:p>
-            <a:pPr marL="457200" indent="-457200">
-              <a:buFont typeface="Calibri" pitchFamily="34" charset="0"/>
-              <a:buChar char="›"/>
-            </a:pPr>
-            <a:r>
-              <a:rPr lang="en-US" sz="3600" dirty="0" smtClean="0"/>
-              <a:t>Intercept traffic (</a:t>
-            </a:r>
-            <a:r>
-              <a:rPr lang="en-US" sz="3600" dirty="0" err="1" smtClean="0"/>
-              <a:t>Wireshark</a:t>
-            </a:r>
-            <a:r>
-              <a:rPr lang="en-US" sz="3600" dirty="0" smtClean="0"/>
-              <a:t> or Fiddler)</a:t>
-            </a:r>
-          </a:p>
-          <a:p>
-            <a:pPr marL="457200" indent="-457200">
-              <a:buFont typeface="Calibri" pitchFamily="34" charset="0"/>
-              <a:buChar char="›"/>
-            </a:pPr>
-            <a:r>
-              <a:rPr lang="en-US" sz="3600" dirty="0" smtClean="0"/>
-              <a:t>Browser plugin</a:t>
-            </a:r>
-          </a:p>
-          <a:p>
-            <a:pPr marL="914400" lvl="1" indent="-457200">
-              <a:buFont typeface="Calibri" pitchFamily="34" charset="0"/>
-              <a:buChar char="›"/>
-            </a:pPr>
-            <a:r>
-              <a:rPr lang="en-US" sz="3600" dirty="0" smtClean="0"/>
-              <a:t>Chrome: edit this cookie</a:t>
-            </a:r>
-          </a:p>
-          <a:p>
-            <a:pPr marL="914400" lvl="1" indent="-457200">
-              <a:buFont typeface="Calibri" pitchFamily="34" charset="0"/>
-              <a:buChar char="›"/>
-            </a:pPr>
-            <a:endParaRPr lang="en-US" sz="3600" dirty="0" smtClean="0"/>
+              <a:t>How can we test JavaScript?</a:t>
+            </a:r>
           </a:p>
         </p:txBody>
       </p:sp>
     </p:spTree>
     <p:extLst>
       <p:ext uri="{BB962C8B-B14F-4D97-AF65-F5344CB8AC3E}">
-        <p14:creationId xmlns:p14="http://schemas.microsoft.com/office/powerpoint/2010/main" val="32028867"/>
+        <p14:creationId xmlns="" xmlns:p14="http://schemas.microsoft.com/office/powerpoint/2010/main" val="1710283614"/>
       </p:ext>
     </p:extLst>
   </p:cSld>
@@ -5929,22 +7525,21 @@
             <a:pPr algn="ctr"/>
             <a:r>
               <a:rPr lang="en-US" sz="4800" dirty="0" smtClean="0"/>
-              <a:t>Browser tools</a:t>
-            </a:r>
-            <a:endParaRPr lang="en-US" sz="4800" dirty="0" smtClean="0"/>
-          </a:p>
-        </p:txBody>
-      </p:sp>
-      <p:sp>
-        <p:nvSpPr>
-          <p:cNvPr id="8" name="TextBox 7"/>
+              <a:t>Cookies</a:t>
+            </a:r>
+          </a:p>
+        </p:txBody>
+      </p:sp>
+      <p:sp>
+        <p:nvSpPr>
+          <p:cNvPr id="9" name="TextBox 8"/>
           <p:cNvSpPr txBox="1"/>
           <p:nvPr/>
         </p:nvSpPr>
         <p:spPr>
           <a:xfrm>
-            <a:off x="533400" y="1602893"/>
-            <a:ext cx="7772400" cy="2308324"/>
+            <a:off x="457200" y="1752600"/>
+            <a:ext cx="2133600" cy="2677656"/>
           </a:xfrm>
           <a:prstGeom prst="rect">
             <a:avLst/>
@@ -5958,26 +7553,815 @@
           <a:lstStyle/>
           <a:p>
             <a:r>
+              <a:rPr lang="en-US" sz="2400" dirty="0" smtClean="0"/>
+              <a:t>Name </a:t>
+            </a:r>
+          </a:p>
+          <a:p>
+            <a:r>
+              <a:rPr lang="en-US" sz="2400" dirty="0" smtClean="0"/>
+              <a:t>Value </a:t>
+            </a:r>
+          </a:p>
+          <a:p>
+            <a:r>
+              <a:rPr lang="en-US" sz="2400" dirty="0" smtClean="0"/>
+              <a:t>Domain</a:t>
+            </a:r>
+          </a:p>
+          <a:p>
+            <a:r>
+              <a:rPr lang="en-US" sz="2400" dirty="0" smtClean="0"/>
+              <a:t>Path </a:t>
+            </a:r>
+          </a:p>
+          <a:p>
+            <a:r>
+              <a:rPr lang="en-US" sz="2400" dirty="0" smtClean="0"/>
+              <a:t>Expires </a:t>
+            </a:r>
+          </a:p>
+          <a:p>
+            <a:r>
+              <a:rPr lang="en-US" sz="2400" dirty="0" smtClean="0"/>
+              <a:t>Secure</a:t>
+            </a:r>
+          </a:p>
+          <a:p>
+            <a:r>
+              <a:rPr lang="en-US" sz="2400" dirty="0" err="1" smtClean="0"/>
+              <a:t>HttpOnly</a:t>
+            </a:r>
+            <a:endParaRPr lang="en-US" sz="4800" dirty="0" smtClean="0"/>
+          </a:p>
+        </p:txBody>
+      </p:sp>
+      <p:sp>
+        <p:nvSpPr>
+          <p:cNvPr id="12" name="TextBox 11"/>
+          <p:cNvSpPr txBox="1"/>
+          <p:nvPr/>
+        </p:nvSpPr>
+        <p:spPr>
+          <a:xfrm>
+            <a:off x="457200" y="4419600"/>
+            <a:ext cx="8458200" cy="1569660"/>
+          </a:xfrm>
+          <a:prstGeom prst="rect">
+            <a:avLst/>
+          </a:prstGeom>
+          <a:noFill/>
+        </p:spPr>
+        <p:txBody>
+          <a:bodyPr wrap="square" rtlCol="0">
+            <a:spAutoFit/>
+          </a:bodyPr>
+          <a:lstStyle/>
+          <a:p>
+            <a:r>
+              <a:rPr lang="en-US" sz="3200" dirty="0" smtClean="0"/>
+              <a:t>Set-Cookie: user=Aaron; Domain=one-shore.com; Expires=</a:t>
+            </a:r>
+            <a:r>
+              <a:rPr lang="fi-FI" sz="3200" dirty="0" smtClean="0"/>
+              <a:t> Mon Mar 17 2014 18:42:17 GMT-0600; </a:t>
+            </a:r>
+            <a:r>
+              <a:rPr lang="en-US" sz="3200" dirty="0" smtClean="0"/>
+              <a:t>Path=/; </a:t>
+            </a:r>
+            <a:r>
+              <a:rPr lang="fi-FI" sz="3200" dirty="0" smtClean="0"/>
+              <a:t>Secure; HttpOnly</a:t>
+            </a:r>
+            <a:endParaRPr lang="en-US" sz="3200" dirty="0" smtClean="0"/>
+          </a:p>
+        </p:txBody>
+      </p:sp>
+      <p:pic>
+        <p:nvPicPr>
+          <p:cNvPr id="13" name="Picture 12" descr="cookie.jpg"/>
+          <p:cNvPicPr>
+            <a:picLocks noChangeAspect="1"/>
+          </p:cNvPicPr>
+          <p:nvPr/>
+        </p:nvPicPr>
+        <p:blipFill>
+          <a:blip r:embed="rId5" cstate="print"/>
+          <a:stretch>
+            <a:fillRect/>
+          </a:stretch>
+        </p:blipFill>
+        <p:spPr>
+          <a:xfrm>
+            <a:off x="2971800" y="1600200"/>
+            <a:ext cx="2816087" cy="2590800"/>
+          </a:xfrm>
+          <a:prstGeom prst="rect">
+            <a:avLst/>
+          </a:prstGeom>
+        </p:spPr>
+      </p:pic>
+    </p:spTree>
+    <p:extLst>
+      <p:ext uri="{BB962C8B-B14F-4D97-AF65-F5344CB8AC3E}">
+        <p14:creationId xmlns="" xmlns:p14="http://schemas.microsoft.com/office/powerpoint/2010/main" val="535094417"/>
+      </p:ext>
+    </p:extLst>
+  </p:cSld>
+  <p:clrMapOvr>
+    <a:masterClrMapping/>
+  </p:clrMapOvr>
+  <p:timing>
+    <p:tnLst>
+      <p:par>
+        <p:cTn id="1" dur="indefinite" restart="never" nodeType="tmRoot">
+          <p:childTnLst>
+            <p:seq concurrent="1" nextAc="seek">
+              <p:cTn id="2" dur="indefinite" nodeType="mainSeq">
+                <p:childTnLst>
+                  <p:par>
+                    <p:cTn id="3" fill="hold">
+                      <p:stCondLst>
+                        <p:cond delay="indefinite"/>
+                      </p:stCondLst>
+                      <p:childTnLst>
+                        <p:par>
+                          <p:cTn id="4" fill="hold">
+                            <p:stCondLst>
+                              <p:cond delay="0"/>
+                            </p:stCondLst>
+                            <p:childTnLst>
+                              <p:par>
+                                <p:cTn id="5" presetID="10" presetClass="entr" presetSubtype="0" fill="hold" grpId="0" nodeType="clickEffect">
+                                  <p:stCondLst>
+                                    <p:cond delay="0"/>
+                                  </p:stCondLst>
+                                  <p:childTnLst>
+                                    <p:set>
+                                      <p:cBhvr>
+                                        <p:cTn id="6" dur="1" fill="hold">
+                                          <p:stCondLst>
+                                            <p:cond delay="0"/>
+                                          </p:stCondLst>
+                                        </p:cTn>
+                                        <p:tgtEl>
+                                          <p:spTgt spid="9">
+                                            <p:txEl>
+                                              <p:pRg st="0" end="0"/>
+                                            </p:txEl>
+                                          </p:spTgt>
+                                        </p:tgtEl>
+                                        <p:attrNameLst>
+                                          <p:attrName>style.visibility</p:attrName>
+                                        </p:attrNameLst>
+                                      </p:cBhvr>
+                                      <p:to>
+                                        <p:strVal val="visible"/>
+                                      </p:to>
+                                    </p:set>
+                                    <p:animEffect transition="in" filter="fade">
+                                      <p:cBhvr>
+                                        <p:cTn id="7" dur="2000"/>
+                                        <p:tgtEl>
+                                          <p:spTgt spid="9">
+                                            <p:txEl>
+                                              <p:pRg st="0" end="0"/>
+                                            </p:txEl>
+                                          </p:spTgt>
+                                        </p:tgtEl>
+                                      </p:cBhvr>
+                                    </p:animEffect>
+                                  </p:childTnLst>
+                                </p:cTn>
+                              </p:par>
+                              <p:par>
+                                <p:cTn id="8" presetID="10" presetClass="entr" presetSubtype="0" fill="hold" grpId="0" nodeType="withEffect">
+                                  <p:stCondLst>
+                                    <p:cond delay="0"/>
+                                  </p:stCondLst>
+                                  <p:childTnLst>
+                                    <p:set>
+                                      <p:cBhvr>
+                                        <p:cTn id="9" dur="1" fill="hold">
+                                          <p:stCondLst>
+                                            <p:cond delay="0"/>
+                                          </p:stCondLst>
+                                        </p:cTn>
+                                        <p:tgtEl>
+                                          <p:spTgt spid="9">
+                                            <p:txEl>
+                                              <p:pRg st="1" end="1"/>
+                                            </p:txEl>
+                                          </p:spTgt>
+                                        </p:tgtEl>
+                                        <p:attrNameLst>
+                                          <p:attrName>style.visibility</p:attrName>
+                                        </p:attrNameLst>
+                                      </p:cBhvr>
+                                      <p:to>
+                                        <p:strVal val="visible"/>
+                                      </p:to>
+                                    </p:set>
+                                    <p:animEffect transition="in" filter="fade">
+                                      <p:cBhvr>
+                                        <p:cTn id="10" dur="2000"/>
+                                        <p:tgtEl>
+                                          <p:spTgt spid="9">
+                                            <p:txEl>
+                                              <p:pRg st="1" end="1"/>
+                                            </p:txEl>
+                                          </p:spTgt>
+                                        </p:tgtEl>
+                                      </p:cBhvr>
+                                    </p:animEffect>
+                                  </p:childTnLst>
+                                </p:cTn>
+                              </p:par>
+                              <p:par>
+                                <p:cTn id="11" presetID="10" presetClass="entr" presetSubtype="0" fill="hold" grpId="0" nodeType="withEffect">
+                                  <p:stCondLst>
+                                    <p:cond delay="0"/>
+                                  </p:stCondLst>
+                                  <p:childTnLst>
+                                    <p:set>
+                                      <p:cBhvr>
+                                        <p:cTn id="12" dur="1" fill="hold">
+                                          <p:stCondLst>
+                                            <p:cond delay="0"/>
+                                          </p:stCondLst>
+                                        </p:cTn>
+                                        <p:tgtEl>
+                                          <p:spTgt spid="9">
+                                            <p:txEl>
+                                              <p:pRg st="2" end="2"/>
+                                            </p:txEl>
+                                          </p:spTgt>
+                                        </p:tgtEl>
+                                        <p:attrNameLst>
+                                          <p:attrName>style.visibility</p:attrName>
+                                        </p:attrNameLst>
+                                      </p:cBhvr>
+                                      <p:to>
+                                        <p:strVal val="visible"/>
+                                      </p:to>
+                                    </p:set>
+                                    <p:animEffect transition="in" filter="fade">
+                                      <p:cBhvr>
+                                        <p:cTn id="13" dur="2000"/>
+                                        <p:tgtEl>
+                                          <p:spTgt spid="9">
+                                            <p:txEl>
+                                              <p:pRg st="2" end="2"/>
+                                            </p:txEl>
+                                          </p:spTgt>
+                                        </p:tgtEl>
+                                      </p:cBhvr>
+                                    </p:animEffect>
+                                  </p:childTnLst>
+                                </p:cTn>
+                              </p:par>
+                              <p:par>
+                                <p:cTn id="14" presetID="10" presetClass="entr" presetSubtype="0" fill="hold" grpId="0" nodeType="withEffect">
+                                  <p:stCondLst>
+                                    <p:cond delay="0"/>
+                                  </p:stCondLst>
+                                  <p:childTnLst>
+                                    <p:set>
+                                      <p:cBhvr>
+                                        <p:cTn id="15" dur="1" fill="hold">
+                                          <p:stCondLst>
+                                            <p:cond delay="0"/>
+                                          </p:stCondLst>
+                                        </p:cTn>
+                                        <p:tgtEl>
+                                          <p:spTgt spid="9">
+                                            <p:txEl>
+                                              <p:pRg st="3" end="3"/>
+                                            </p:txEl>
+                                          </p:spTgt>
+                                        </p:tgtEl>
+                                        <p:attrNameLst>
+                                          <p:attrName>style.visibility</p:attrName>
+                                        </p:attrNameLst>
+                                      </p:cBhvr>
+                                      <p:to>
+                                        <p:strVal val="visible"/>
+                                      </p:to>
+                                    </p:set>
+                                    <p:animEffect transition="in" filter="fade">
+                                      <p:cBhvr>
+                                        <p:cTn id="16" dur="2000"/>
+                                        <p:tgtEl>
+                                          <p:spTgt spid="9">
+                                            <p:txEl>
+                                              <p:pRg st="3" end="3"/>
+                                            </p:txEl>
+                                          </p:spTgt>
+                                        </p:tgtEl>
+                                      </p:cBhvr>
+                                    </p:animEffect>
+                                  </p:childTnLst>
+                                </p:cTn>
+                              </p:par>
+                              <p:par>
+                                <p:cTn id="17" presetID="10" presetClass="entr" presetSubtype="0" fill="hold" grpId="0" nodeType="withEffect">
+                                  <p:stCondLst>
+                                    <p:cond delay="0"/>
+                                  </p:stCondLst>
+                                  <p:childTnLst>
+                                    <p:set>
+                                      <p:cBhvr>
+                                        <p:cTn id="18" dur="1" fill="hold">
+                                          <p:stCondLst>
+                                            <p:cond delay="0"/>
+                                          </p:stCondLst>
+                                        </p:cTn>
+                                        <p:tgtEl>
+                                          <p:spTgt spid="9">
+                                            <p:txEl>
+                                              <p:pRg st="4" end="4"/>
+                                            </p:txEl>
+                                          </p:spTgt>
+                                        </p:tgtEl>
+                                        <p:attrNameLst>
+                                          <p:attrName>style.visibility</p:attrName>
+                                        </p:attrNameLst>
+                                      </p:cBhvr>
+                                      <p:to>
+                                        <p:strVal val="visible"/>
+                                      </p:to>
+                                    </p:set>
+                                    <p:animEffect transition="in" filter="fade">
+                                      <p:cBhvr>
+                                        <p:cTn id="19" dur="2000"/>
+                                        <p:tgtEl>
+                                          <p:spTgt spid="9">
+                                            <p:txEl>
+                                              <p:pRg st="4" end="4"/>
+                                            </p:txEl>
+                                          </p:spTgt>
+                                        </p:tgtEl>
+                                      </p:cBhvr>
+                                    </p:animEffect>
+                                  </p:childTnLst>
+                                </p:cTn>
+                              </p:par>
+                              <p:par>
+                                <p:cTn id="20" presetID="10" presetClass="entr" presetSubtype="0" fill="hold" grpId="0" nodeType="withEffect">
+                                  <p:stCondLst>
+                                    <p:cond delay="0"/>
+                                  </p:stCondLst>
+                                  <p:childTnLst>
+                                    <p:set>
+                                      <p:cBhvr>
+                                        <p:cTn id="21" dur="1" fill="hold">
+                                          <p:stCondLst>
+                                            <p:cond delay="0"/>
+                                          </p:stCondLst>
+                                        </p:cTn>
+                                        <p:tgtEl>
+                                          <p:spTgt spid="9">
+                                            <p:txEl>
+                                              <p:pRg st="5" end="5"/>
+                                            </p:txEl>
+                                          </p:spTgt>
+                                        </p:tgtEl>
+                                        <p:attrNameLst>
+                                          <p:attrName>style.visibility</p:attrName>
+                                        </p:attrNameLst>
+                                      </p:cBhvr>
+                                      <p:to>
+                                        <p:strVal val="visible"/>
+                                      </p:to>
+                                    </p:set>
+                                    <p:animEffect transition="in" filter="fade">
+                                      <p:cBhvr>
+                                        <p:cTn id="22" dur="2000"/>
+                                        <p:tgtEl>
+                                          <p:spTgt spid="9">
+                                            <p:txEl>
+                                              <p:pRg st="5" end="5"/>
+                                            </p:txEl>
+                                          </p:spTgt>
+                                        </p:tgtEl>
+                                      </p:cBhvr>
+                                    </p:animEffect>
+                                  </p:childTnLst>
+                                </p:cTn>
+                              </p:par>
+                              <p:par>
+                                <p:cTn id="23" presetID="10" presetClass="entr" presetSubtype="0" fill="hold" grpId="0" nodeType="withEffect">
+                                  <p:stCondLst>
+                                    <p:cond delay="0"/>
+                                  </p:stCondLst>
+                                  <p:childTnLst>
+                                    <p:set>
+                                      <p:cBhvr>
+                                        <p:cTn id="24" dur="1" fill="hold">
+                                          <p:stCondLst>
+                                            <p:cond delay="0"/>
+                                          </p:stCondLst>
+                                        </p:cTn>
+                                        <p:tgtEl>
+                                          <p:spTgt spid="9">
+                                            <p:txEl>
+                                              <p:pRg st="6" end="6"/>
+                                            </p:txEl>
+                                          </p:spTgt>
+                                        </p:tgtEl>
+                                        <p:attrNameLst>
+                                          <p:attrName>style.visibility</p:attrName>
+                                        </p:attrNameLst>
+                                      </p:cBhvr>
+                                      <p:to>
+                                        <p:strVal val="visible"/>
+                                      </p:to>
+                                    </p:set>
+                                    <p:animEffect transition="in" filter="fade">
+                                      <p:cBhvr>
+                                        <p:cTn id="25" dur="2000"/>
+                                        <p:tgtEl>
+                                          <p:spTgt spid="9">
+                                            <p:txEl>
+                                              <p:pRg st="6" end="6"/>
+                                            </p:txEl>
+                                          </p:spTgt>
+                                        </p:tgtEl>
+                                      </p:cBhvr>
+                                    </p:animEffect>
+                                  </p:childTnLst>
+                                </p:cTn>
+                              </p:par>
+                            </p:childTnLst>
+                          </p:cTn>
+                        </p:par>
+                      </p:childTnLst>
+                    </p:cTn>
+                  </p:par>
+                  <p:par>
+                    <p:cTn id="26" fill="hold">
+                      <p:stCondLst>
+                        <p:cond delay="indefinite"/>
+                      </p:stCondLst>
+                      <p:childTnLst>
+                        <p:par>
+                          <p:cTn id="27" fill="hold">
+                            <p:stCondLst>
+                              <p:cond delay="0"/>
+                            </p:stCondLst>
+                            <p:childTnLst>
+                              <p:par>
+                                <p:cTn id="28" presetID="10" presetClass="entr" presetSubtype="0" fill="hold" nodeType="clickEffect">
+                                  <p:stCondLst>
+                                    <p:cond delay="0"/>
+                                  </p:stCondLst>
+                                  <p:childTnLst>
+                                    <p:set>
+                                      <p:cBhvr>
+                                        <p:cTn id="29" dur="1" fill="hold">
+                                          <p:stCondLst>
+                                            <p:cond delay="0"/>
+                                          </p:stCondLst>
+                                        </p:cTn>
+                                        <p:tgtEl>
+                                          <p:spTgt spid="13"/>
+                                        </p:tgtEl>
+                                        <p:attrNameLst>
+                                          <p:attrName>style.visibility</p:attrName>
+                                        </p:attrNameLst>
+                                      </p:cBhvr>
+                                      <p:to>
+                                        <p:strVal val="visible"/>
+                                      </p:to>
+                                    </p:set>
+                                    <p:animEffect transition="in" filter="fade">
+                                      <p:cBhvr>
+                                        <p:cTn id="30" dur="2000"/>
+                                        <p:tgtEl>
+                                          <p:spTgt spid="13"/>
+                                        </p:tgtEl>
+                                      </p:cBhvr>
+                                    </p:animEffect>
+                                  </p:childTnLst>
+                                </p:cTn>
+                              </p:par>
+                            </p:childTnLst>
+                          </p:cTn>
+                        </p:par>
+                      </p:childTnLst>
+                    </p:cTn>
+                  </p:par>
+                </p:childTnLst>
+              </p:cTn>
+              <p:prevCondLst>
+                <p:cond evt="onPrev" delay="0">
+                  <p:tgtEl>
+                    <p:sldTgt/>
+                  </p:tgtEl>
+                </p:cond>
+              </p:prevCondLst>
+              <p:nextCondLst>
+                <p:cond evt="onNext" delay="0">
+                  <p:tgtEl>
+                    <p:sldTgt/>
+                  </p:tgtEl>
+                </p:cond>
+              </p:nextCondLst>
+            </p:seq>
+          </p:childTnLst>
+        </p:cTn>
+      </p:par>
+    </p:tnLst>
+    <p:bldLst>
+      <p:bldP spid="9" grpId="0" build="allAtOnce"/>
+    </p:bldLst>
+  </p:timing>
+</p:sld>
+</file>
+
+<file path=ppt/slides/slide8.xml><?xml version="1.0" encoding="utf-8"?>
+<p:sld xmlns:a="http://schemas.openxmlformats.org/drawingml/2006/main" xmlns:r="http://schemas.openxmlformats.org/officeDocument/2006/relationships" xmlns:p="http://schemas.openxmlformats.org/presentationml/2006/main">
+  <p:cSld>
+    <p:spTree>
+      <p:nvGrpSpPr>
+        <p:cNvPr id="1" name=""/>
+        <p:cNvGrpSpPr/>
+        <p:nvPr/>
+      </p:nvGrpSpPr>
+      <p:grpSpPr>
+        <a:xfrm>
+          <a:off x="0" y="0"/>
+          <a:ext cx="0" cy="0"/>
+          <a:chOff x="0" y="0"/>
+          <a:chExt cx="0" cy="0"/>
+        </a:xfrm>
+      </p:grpSpPr>
+      <p:sp>
+        <p:nvSpPr>
+          <p:cNvPr id="4" name="Rectangle 3"/>
+          <p:cNvSpPr/>
+          <p:nvPr/>
+        </p:nvSpPr>
+        <p:spPr>
+          <a:xfrm>
+            <a:off x="0" y="6096000"/>
+            <a:ext cx="9144000" cy="762000"/>
+          </a:xfrm>
+          <a:prstGeom prst="rect">
+            <a:avLst/>
+          </a:prstGeom>
+          <a:solidFill>
+            <a:schemeClr val="tx1">
+              <a:lumMod val="85000"/>
+              <a:lumOff val="15000"/>
+            </a:schemeClr>
+          </a:solidFill>
+        </p:spPr>
+        <p:style>
+          <a:lnRef idx="2">
+            <a:schemeClr val="accent1">
+              <a:shade val="50000"/>
+            </a:schemeClr>
+          </a:lnRef>
+          <a:fillRef idx="1">
+            <a:schemeClr val="accent1"/>
+          </a:fillRef>
+          <a:effectRef idx="0">
+            <a:schemeClr val="accent1"/>
+          </a:effectRef>
+          <a:fontRef idx="minor">
+            <a:schemeClr val="lt1"/>
+          </a:fontRef>
+        </p:style>
+        <p:txBody>
+          <a:bodyPr rtlCol="0" anchor="ctr"/>
+          <a:lstStyle/>
+          <a:p>
+            <a:pPr algn="ctr"/>
+            <a:endParaRPr lang="en-US"/>
+          </a:p>
+        </p:txBody>
+      </p:sp>
+      <p:pic>
+        <p:nvPicPr>
+          <p:cNvPr id="1027" name="Picture 3"/>
+          <p:cNvPicPr>
+            <a:picLocks noChangeAspect="1" noChangeArrowheads="1"/>
+          </p:cNvPicPr>
+          <p:nvPr/>
+        </p:nvPicPr>
+        <p:blipFill>
+          <a:blip r:embed="rId3" cstate="print"/>
+          <a:srcRect/>
+          <a:stretch>
+            <a:fillRect/>
+          </a:stretch>
+        </p:blipFill>
+        <p:spPr bwMode="auto">
+          <a:xfrm>
+            <a:off x="228600" y="6248400"/>
+            <a:ext cx="1371600" cy="410346"/>
+          </a:xfrm>
+          <a:prstGeom prst="rect">
+            <a:avLst/>
+          </a:prstGeom>
+          <a:noFill/>
+          <a:ln w="9525">
+            <a:noFill/>
+            <a:miter lim="800000"/>
+            <a:headEnd/>
+            <a:tailEnd/>
+          </a:ln>
+          <a:effectLst/>
+        </p:spPr>
+      </p:pic>
+      <p:sp>
+        <p:nvSpPr>
+          <p:cNvPr id="10" name="TextBox 9"/>
+          <p:cNvSpPr txBox="1"/>
+          <p:nvPr/>
+        </p:nvSpPr>
+        <p:spPr>
+          <a:xfrm>
+            <a:off x="1905000" y="6324600"/>
+            <a:ext cx="4648200" cy="369332"/>
+          </a:xfrm>
+          <a:prstGeom prst="rect">
+            <a:avLst/>
+          </a:prstGeom>
+          <a:noFill/>
+        </p:spPr>
+        <p:txBody>
+          <a:bodyPr wrap="square" rtlCol="0">
+            <a:spAutoFit/>
+          </a:bodyPr>
+          <a:lstStyle/>
+          <a:p>
+            <a:pPr algn="ctr"/>
+            <a:r>
+              <a:rPr lang="en-US" dirty="0" smtClean="0">
+                <a:solidFill>
+                  <a:schemeClr val="bg1"/>
+                </a:solidFill>
+                <a:latin typeface="Verdana" pitchFamily="34" charset="0"/>
+                <a:ea typeface="Verdana" pitchFamily="34" charset="0"/>
+                <a:cs typeface="Verdana" pitchFamily="34" charset="0"/>
+              </a:rPr>
+              <a:t>Testing web applications</a:t>
+            </a:r>
+            <a:endParaRPr lang="en-US" dirty="0">
+              <a:solidFill>
+                <a:schemeClr val="bg1"/>
+              </a:solidFill>
+              <a:latin typeface="Verdana" pitchFamily="34" charset="0"/>
+              <a:ea typeface="Verdana" pitchFamily="34" charset="0"/>
+              <a:cs typeface="Verdana" pitchFamily="34" charset="0"/>
+            </a:endParaRPr>
+          </a:p>
+        </p:txBody>
+      </p:sp>
+      <p:pic>
+        <p:nvPicPr>
+          <p:cNvPr id="1033" name="Picture 9"/>
+          <p:cNvPicPr>
+            <a:picLocks noChangeAspect="1" noChangeArrowheads="1"/>
+          </p:cNvPicPr>
+          <p:nvPr/>
+        </p:nvPicPr>
+        <p:blipFill>
+          <a:blip r:embed="rId4" cstate="print"/>
+          <a:srcRect/>
+          <a:stretch>
+            <a:fillRect/>
+          </a:stretch>
+        </p:blipFill>
+        <p:spPr bwMode="auto">
+          <a:xfrm>
+            <a:off x="6934202" y="6248400"/>
+            <a:ext cx="1981195" cy="431239"/>
+          </a:xfrm>
+          <a:prstGeom prst="rect">
+            <a:avLst/>
+          </a:prstGeom>
+          <a:noFill/>
+          <a:ln w="9525">
+            <a:noFill/>
+            <a:miter lim="800000"/>
+            <a:headEnd/>
+            <a:tailEnd/>
+          </a:ln>
+          <a:effectLst/>
+        </p:spPr>
+      </p:pic>
+      <p:sp>
+        <p:nvSpPr>
+          <p:cNvPr id="18" name="TextBox 17"/>
+          <p:cNvSpPr txBox="1"/>
+          <p:nvPr/>
+        </p:nvSpPr>
+        <p:spPr>
+          <a:xfrm>
+            <a:off x="0" y="762000"/>
+            <a:ext cx="9144000" cy="830997"/>
+          </a:xfrm>
+          <a:prstGeom prst="rect">
+            <a:avLst/>
+          </a:prstGeom>
+          <a:noFill/>
+        </p:spPr>
+        <p:txBody>
+          <a:bodyPr wrap="square" rtlCol="0">
+            <a:spAutoFit/>
+          </a:bodyPr>
+          <a:lstStyle/>
+          <a:p>
+            <a:pPr algn="ctr"/>
+            <a:r>
+              <a:rPr lang="en-US" sz="4800" dirty="0" smtClean="0"/>
+              <a:t>Testing cookies</a:t>
+            </a:r>
+          </a:p>
+        </p:txBody>
+      </p:sp>
+      <p:sp>
+        <p:nvSpPr>
+          <p:cNvPr id="8" name="TextBox 7"/>
+          <p:cNvSpPr txBox="1"/>
+          <p:nvPr/>
+        </p:nvSpPr>
+        <p:spPr>
+          <a:xfrm>
+            <a:off x="533400" y="1602893"/>
+            <a:ext cx="7772400" cy="3416320"/>
+          </a:xfrm>
+          <a:prstGeom prst="rect">
+            <a:avLst/>
+          </a:prstGeom>
+          <a:noFill/>
+        </p:spPr>
+        <p:txBody>
+          <a:bodyPr wrap="square" rtlCol="0">
+            <a:spAutoFit/>
+          </a:bodyPr>
+          <a:lstStyle/>
+          <a:p>
+            <a:pPr marL="457200" indent="-457200">
+              <a:buFont typeface="Calibri" pitchFamily="34" charset="0"/>
+              <a:buChar char="›"/>
+            </a:pPr>
+            <a:r>
               <a:rPr lang="en-US" sz="3600" dirty="0" smtClean="0"/>
-              <a:t>Chrome: Deve</a:t>
-            </a:r>
+              <a:t>Verify behavior</a:t>
+            </a:r>
+          </a:p>
+          <a:p>
+            <a:pPr marL="457200" indent="-457200">
+              <a:buFont typeface="Calibri" pitchFamily="34" charset="0"/>
+              <a:buChar char="›"/>
+            </a:pPr>
             <a:r>
               <a:rPr lang="en-US" sz="3600" dirty="0" smtClean="0"/>
-              <a:t>loper tools (built in)</a:t>
-            </a:r>
-          </a:p>
-          <a:p>
+              <a:t>View cookies</a:t>
+            </a:r>
+          </a:p>
+          <a:p>
+            <a:pPr marL="457200" indent="-457200">
+              <a:buFont typeface="Calibri" pitchFamily="34" charset="0"/>
+              <a:buChar char="›"/>
+            </a:pPr>
             <a:r>
               <a:rPr lang="en-US" sz="3600" dirty="0" smtClean="0"/>
-              <a:t>Firefox: Firebug (plugin)</a:t>
-            </a:r>
-          </a:p>
-          <a:p>
-            <a:r>
-              <a:rPr lang="en-US" sz="3600" smtClean="0"/>
-              <a:t>IE: F12</a:t>
-            </a:r>
-            <a:endParaRPr lang="en-US" sz="3600" dirty="0" smtClean="0"/>
+              <a:t>Intercept traffic (</a:t>
+            </a:r>
+            <a:r>
+              <a:rPr lang="en-US" sz="3600" dirty="0" err="1" smtClean="0"/>
+              <a:t>Wireshark</a:t>
+            </a:r>
+            <a:r>
+              <a:rPr lang="en-US" sz="3600" dirty="0" smtClean="0"/>
+              <a:t> or Fiddler)</a:t>
+            </a:r>
+          </a:p>
+          <a:p>
+            <a:pPr marL="457200" indent="-457200">
+              <a:buFont typeface="Calibri" pitchFamily="34" charset="0"/>
+              <a:buChar char="›"/>
+            </a:pPr>
+            <a:r>
+              <a:rPr lang="en-US" sz="3600" dirty="0" smtClean="0"/>
+              <a:t>Browser plugin</a:t>
+            </a:r>
+          </a:p>
+          <a:p>
+            <a:pPr marL="914400" lvl="1" indent="-457200">
+              <a:buFont typeface="Calibri" pitchFamily="34" charset="0"/>
+              <a:buChar char="›"/>
+            </a:pPr>
+            <a:r>
+              <a:rPr lang="en-US" sz="3600" dirty="0" smtClean="0"/>
+              <a:t>Chrome: edit this cookie	</a:t>
+            </a:r>
           </a:p>
           <a:p>
             <a:pPr marL="914400" lvl="1" indent="-457200">
@@ -5991,7 +8375,260 @@
     </p:spTree>
     <p:extLst>
       <p:ext uri="{BB962C8B-B14F-4D97-AF65-F5344CB8AC3E}">
-        <p14:creationId xmlns:p14="http://schemas.microsoft.com/office/powerpoint/2010/main" val="535094417"/>
+        <p14:creationId xmlns="" xmlns:p14="http://schemas.microsoft.com/office/powerpoint/2010/main" val="32028867"/>
+      </p:ext>
+    </p:extLst>
+  </p:cSld>
+  <p:clrMapOvr>
+    <a:masterClrMapping/>
+  </p:clrMapOvr>
+  <p:timing>
+    <p:tnLst>
+      <p:par>
+        <p:cTn id="1" dur="indefinite" restart="never" nodeType="tmRoot"/>
+      </p:par>
+    </p:tnLst>
+  </p:timing>
+</p:sld>
+</file>
+
+<file path=ppt/slides/slide9.xml><?xml version="1.0" encoding="utf-8"?>
+<p:sld xmlns:a="http://schemas.openxmlformats.org/drawingml/2006/main" xmlns:r="http://schemas.openxmlformats.org/officeDocument/2006/relationships" xmlns:p="http://schemas.openxmlformats.org/presentationml/2006/main">
+  <p:cSld>
+    <p:spTree>
+      <p:nvGrpSpPr>
+        <p:cNvPr id="1" name=""/>
+        <p:cNvGrpSpPr/>
+        <p:nvPr/>
+      </p:nvGrpSpPr>
+      <p:grpSpPr>
+        <a:xfrm>
+          <a:off x="0" y="0"/>
+          <a:ext cx="0" cy="0"/>
+          <a:chOff x="0" y="0"/>
+          <a:chExt cx="0" cy="0"/>
+        </a:xfrm>
+      </p:grpSpPr>
+      <p:sp>
+        <p:nvSpPr>
+          <p:cNvPr id="4" name="Rectangle 3"/>
+          <p:cNvSpPr/>
+          <p:nvPr/>
+        </p:nvSpPr>
+        <p:spPr>
+          <a:xfrm>
+            <a:off x="0" y="6096000"/>
+            <a:ext cx="9144000" cy="762000"/>
+          </a:xfrm>
+          <a:prstGeom prst="rect">
+            <a:avLst/>
+          </a:prstGeom>
+          <a:solidFill>
+            <a:schemeClr val="tx1">
+              <a:lumMod val="85000"/>
+              <a:lumOff val="15000"/>
+            </a:schemeClr>
+          </a:solidFill>
+        </p:spPr>
+        <p:style>
+          <a:lnRef idx="2">
+            <a:schemeClr val="accent1">
+              <a:shade val="50000"/>
+            </a:schemeClr>
+          </a:lnRef>
+          <a:fillRef idx="1">
+            <a:schemeClr val="accent1"/>
+          </a:fillRef>
+          <a:effectRef idx="0">
+            <a:schemeClr val="accent1"/>
+          </a:effectRef>
+          <a:fontRef idx="minor">
+            <a:schemeClr val="lt1"/>
+          </a:fontRef>
+        </p:style>
+        <p:txBody>
+          <a:bodyPr rtlCol="0" anchor="ctr"/>
+          <a:lstStyle/>
+          <a:p>
+            <a:pPr algn="ctr"/>
+            <a:endParaRPr lang="en-US"/>
+          </a:p>
+        </p:txBody>
+      </p:sp>
+      <p:pic>
+        <p:nvPicPr>
+          <p:cNvPr id="1027" name="Picture 3"/>
+          <p:cNvPicPr>
+            <a:picLocks noChangeAspect="1" noChangeArrowheads="1"/>
+          </p:cNvPicPr>
+          <p:nvPr/>
+        </p:nvPicPr>
+        <p:blipFill>
+          <a:blip r:embed="rId3" cstate="print"/>
+          <a:srcRect/>
+          <a:stretch>
+            <a:fillRect/>
+          </a:stretch>
+        </p:blipFill>
+        <p:spPr bwMode="auto">
+          <a:xfrm>
+            <a:off x="228600" y="6248400"/>
+            <a:ext cx="1371600" cy="410346"/>
+          </a:xfrm>
+          <a:prstGeom prst="rect">
+            <a:avLst/>
+          </a:prstGeom>
+          <a:noFill/>
+          <a:ln w="9525">
+            <a:noFill/>
+            <a:miter lim="800000"/>
+            <a:headEnd/>
+            <a:tailEnd/>
+          </a:ln>
+          <a:effectLst/>
+        </p:spPr>
+      </p:pic>
+      <p:sp>
+        <p:nvSpPr>
+          <p:cNvPr id="10" name="TextBox 9"/>
+          <p:cNvSpPr txBox="1"/>
+          <p:nvPr/>
+        </p:nvSpPr>
+        <p:spPr>
+          <a:xfrm>
+            <a:off x="1905000" y="6324600"/>
+            <a:ext cx="4648200" cy="369332"/>
+          </a:xfrm>
+          <a:prstGeom prst="rect">
+            <a:avLst/>
+          </a:prstGeom>
+          <a:noFill/>
+        </p:spPr>
+        <p:txBody>
+          <a:bodyPr wrap="square" rtlCol="0">
+            <a:spAutoFit/>
+          </a:bodyPr>
+          <a:lstStyle/>
+          <a:p>
+            <a:pPr algn="ctr"/>
+            <a:r>
+              <a:rPr lang="en-US" dirty="0" smtClean="0">
+                <a:solidFill>
+                  <a:schemeClr val="bg1"/>
+                </a:solidFill>
+                <a:latin typeface="Verdana" pitchFamily="34" charset="0"/>
+                <a:ea typeface="Verdana" pitchFamily="34" charset="0"/>
+                <a:cs typeface="Verdana" pitchFamily="34" charset="0"/>
+              </a:rPr>
+              <a:t>Testing web applications</a:t>
+            </a:r>
+            <a:endParaRPr lang="en-US" dirty="0">
+              <a:solidFill>
+                <a:schemeClr val="bg1"/>
+              </a:solidFill>
+              <a:latin typeface="Verdana" pitchFamily="34" charset="0"/>
+              <a:ea typeface="Verdana" pitchFamily="34" charset="0"/>
+              <a:cs typeface="Verdana" pitchFamily="34" charset="0"/>
+            </a:endParaRPr>
+          </a:p>
+        </p:txBody>
+      </p:sp>
+      <p:pic>
+        <p:nvPicPr>
+          <p:cNvPr id="1033" name="Picture 9"/>
+          <p:cNvPicPr>
+            <a:picLocks noChangeAspect="1" noChangeArrowheads="1"/>
+          </p:cNvPicPr>
+          <p:nvPr/>
+        </p:nvPicPr>
+        <p:blipFill>
+          <a:blip r:embed="rId4" cstate="print"/>
+          <a:srcRect/>
+          <a:stretch>
+            <a:fillRect/>
+          </a:stretch>
+        </p:blipFill>
+        <p:spPr bwMode="auto">
+          <a:xfrm>
+            <a:off x="6934202" y="6248400"/>
+            <a:ext cx="1981195" cy="431239"/>
+          </a:xfrm>
+          <a:prstGeom prst="rect">
+            <a:avLst/>
+          </a:prstGeom>
+          <a:noFill/>
+          <a:ln w="9525">
+            <a:noFill/>
+            <a:miter lim="800000"/>
+            <a:headEnd/>
+            <a:tailEnd/>
+          </a:ln>
+          <a:effectLst/>
+        </p:spPr>
+      </p:pic>
+      <p:sp>
+        <p:nvSpPr>
+          <p:cNvPr id="18" name="TextBox 17"/>
+          <p:cNvSpPr txBox="1"/>
+          <p:nvPr/>
+        </p:nvSpPr>
+        <p:spPr>
+          <a:xfrm>
+            <a:off x="0" y="762000"/>
+            <a:ext cx="9144000" cy="830997"/>
+          </a:xfrm>
+          <a:prstGeom prst="rect">
+            <a:avLst/>
+          </a:prstGeom>
+          <a:noFill/>
+        </p:spPr>
+        <p:txBody>
+          <a:bodyPr wrap="square" rtlCol="0">
+            <a:spAutoFit/>
+          </a:bodyPr>
+          <a:lstStyle/>
+          <a:p>
+            <a:pPr algn="ctr"/>
+            <a:r>
+              <a:rPr lang="en-US" sz="4800" dirty="0" smtClean="0"/>
+              <a:t>Clearing Cookies</a:t>
+            </a:r>
+          </a:p>
+        </p:txBody>
+      </p:sp>
+      <p:sp>
+        <p:nvSpPr>
+          <p:cNvPr id="9" name="Rectangle 8"/>
+          <p:cNvSpPr/>
+          <p:nvPr/>
+        </p:nvSpPr>
+        <p:spPr>
+          <a:xfrm>
+            <a:off x="4453217" y="3244334"/>
+            <a:ext cx="237566" cy="369332"/>
+          </a:xfrm>
+          <a:prstGeom prst="rect">
+            <a:avLst/>
+          </a:prstGeom>
+        </p:spPr>
+        <p:txBody>
+          <a:bodyPr wrap="none">
+            <a:spAutoFit/>
+          </a:bodyPr>
+          <a:lstStyle/>
+          <a:p>
+            <a:r>
+              <a:rPr lang="en-US" dirty="0" smtClean="0"/>
+              <a:t> </a:t>
+            </a:r>
+            <a:endParaRPr lang="en-US" dirty="0"/>
+          </a:p>
+        </p:txBody>
+      </p:sp>
+    </p:spTree>
+    <p:extLst>
+      <p:ext uri="{BB962C8B-B14F-4D97-AF65-F5344CB8AC3E}">
+        <p14:creationId xmlns="" xmlns:p14="http://schemas.microsoft.com/office/powerpoint/2010/main" val="535094417"/>
       </p:ext>
     </p:extLst>
   </p:cSld>

</xml_diff>

<commit_message>
Web services explained and Tools for testing web services presentations are done
</commit_message>
<xml_diff>
--- a/presentations/Testing web apps.pptx
+++ b/presentations/Testing web apps.pptx
@@ -220,7 +220,7 @@
             <a:fld id="{4B12C2AF-FB53-4902-8686-E189B5D70A4D}" type="datetimeFigureOut">
               <a:rPr lang="en-US" smtClean="0"/>
               <a:pPr/>
-              <a:t>3/12/2013</a:t>
+              <a:t>3/17/2013</a:t>
             </a:fld>
             <a:endParaRPr lang="en-US"/>
           </a:p>
@@ -389,7 +389,7 @@
     </p:spTree>
     <p:extLst>
       <p:ext uri="{BB962C8B-B14F-4D97-AF65-F5344CB8AC3E}">
-        <p14:creationId xmlns:p14="http://schemas.microsoft.com/office/powerpoint/2010/main" val="3015537463"/>
+        <p14:creationId xmlns:p14="http://schemas.microsoft.com/office/powerpoint/2010/main" xmlns="" val="3015537463"/>
       </p:ext>
     </p:extLst>
   </p:cSld>
@@ -4624,7 +4624,7 @@
             <a:fld id="{6FAF76D1-06A1-4878-995B-DD4F41EEDC53}" type="datetimeFigureOut">
               <a:rPr lang="en-US" smtClean="0"/>
               <a:pPr/>
-              <a:t>3/12/2013</a:t>
+              <a:t>3/17/2013</a:t>
             </a:fld>
             <a:endParaRPr lang="en-US"/>
           </a:p>
@@ -4676,7 +4676,7 @@
     </p:spTree>
     <p:extLst>
       <p:ext uri="{BB962C8B-B14F-4D97-AF65-F5344CB8AC3E}">
-        <p14:creationId xmlns:p14="http://schemas.microsoft.com/office/powerpoint/2010/main" val="45077974"/>
+        <p14:creationId xmlns:p14="http://schemas.microsoft.com/office/powerpoint/2010/main" xmlns="" val="45077974"/>
       </p:ext>
     </p:extLst>
   </p:cSld>
@@ -4796,7 +4796,7 @@
             <a:fld id="{6FAF76D1-06A1-4878-995B-DD4F41EEDC53}" type="datetimeFigureOut">
               <a:rPr lang="en-US" smtClean="0"/>
               <a:pPr/>
-              <a:t>3/12/2013</a:t>
+              <a:t>3/17/2013</a:t>
             </a:fld>
             <a:endParaRPr lang="en-US"/>
           </a:p>
@@ -4848,7 +4848,7 @@
     </p:spTree>
     <p:extLst>
       <p:ext uri="{BB962C8B-B14F-4D97-AF65-F5344CB8AC3E}">
-        <p14:creationId xmlns:p14="http://schemas.microsoft.com/office/powerpoint/2010/main" val="3768407640"/>
+        <p14:creationId xmlns:p14="http://schemas.microsoft.com/office/powerpoint/2010/main" xmlns="" val="3768407640"/>
       </p:ext>
     </p:extLst>
   </p:cSld>
@@ -4978,7 +4978,7 @@
             <a:fld id="{6FAF76D1-06A1-4878-995B-DD4F41EEDC53}" type="datetimeFigureOut">
               <a:rPr lang="en-US" smtClean="0"/>
               <a:pPr/>
-              <a:t>3/12/2013</a:t>
+              <a:t>3/17/2013</a:t>
             </a:fld>
             <a:endParaRPr lang="en-US"/>
           </a:p>
@@ -5030,7 +5030,7 @@
     </p:spTree>
     <p:extLst>
       <p:ext uri="{BB962C8B-B14F-4D97-AF65-F5344CB8AC3E}">
-        <p14:creationId xmlns:p14="http://schemas.microsoft.com/office/powerpoint/2010/main" val="1458810807"/>
+        <p14:creationId xmlns:p14="http://schemas.microsoft.com/office/powerpoint/2010/main" xmlns="" val="1458810807"/>
       </p:ext>
     </p:extLst>
   </p:cSld>
@@ -5150,7 +5150,7 @@
             <a:fld id="{6FAF76D1-06A1-4878-995B-DD4F41EEDC53}" type="datetimeFigureOut">
               <a:rPr lang="en-US" smtClean="0"/>
               <a:pPr/>
-              <a:t>3/12/2013</a:t>
+              <a:t>3/17/2013</a:t>
             </a:fld>
             <a:endParaRPr lang="en-US"/>
           </a:p>
@@ -5202,7 +5202,7 @@
     </p:spTree>
     <p:extLst>
       <p:ext uri="{BB962C8B-B14F-4D97-AF65-F5344CB8AC3E}">
-        <p14:creationId xmlns:p14="http://schemas.microsoft.com/office/powerpoint/2010/main" val="832050394"/>
+        <p14:creationId xmlns:p14="http://schemas.microsoft.com/office/powerpoint/2010/main" xmlns="" val="832050394"/>
       </p:ext>
     </p:extLst>
   </p:cSld>
@@ -5398,7 +5398,7 @@
             <a:fld id="{6FAF76D1-06A1-4878-995B-DD4F41EEDC53}" type="datetimeFigureOut">
               <a:rPr lang="en-US" smtClean="0"/>
               <a:pPr/>
-              <a:t>3/12/2013</a:t>
+              <a:t>3/17/2013</a:t>
             </a:fld>
             <a:endParaRPr lang="en-US"/>
           </a:p>
@@ -5450,7 +5450,7 @@
     </p:spTree>
     <p:extLst>
       <p:ext uri="{BB962C8B-B14F-4D97-AF65-F5344CB8AC3E}">
-        <p14:creationId xmlns:p14="http://schemas.microsoft.com/office/powerpoint/2010/main" val="4137565780"/>
+        <p14:creationId xmlns:p14="http://schemas.microsoft.com/office/powerpoint/2010/main" xmlns="" val="4137565780"/>
       </p:ext>
     </p:extLst>
   </p:cSld>
@@ -5688,7 +5688,7 @@
             <a:fld id="{6FAF76D1-06A1-4878-995B-DD4F41EEDC53}" type="datetimeFigureOut">
               <a:rPr lang="en-US" smtClean="0"/>
               <a:pPr/>
-              <a:t>3/12/2013</a:t>
+              <a:t>3/17/2013</a:t>
             </a:fld>
             <a:endParaRPr lang="en-US"/>
           </a:p>
@@ -5740,7 +5740,7 @@
     </p:spTree>
     <p:extLst>
       <p:ext uri="{BB962C8B-B14F-4D97-AF65-F5344CB8AC3E}">
-        <p14:creationId xmlns:p14="http://schemas.microsoft.com/office/powerpoint/2010/main" val="2737350807"/>
+        <p14:creationId xmlns:p14="http://schemas.microsoft.com/office/powerpoint/2010/main" xmlns="" val="2737350807"/>
       </p:ext>
     </p:extLst>
   </p:cSld>
@@ -6112,7 +6112,7 @@
             <a:fld id="{6FAF76D1-06A1-4878-995B-DD4F41EEDC53}" type="datetimeFigureOut">
               <a:rPr lang="en-US" smtClean="0"/>
               <a:pPr/>
-              <a:t>3/12/2013</a:t>
+              <a:t>3/17/2013</a:t>
             </a:fld>
             <a:endParaRPr lang="en-US"/>
           </a:p>
@@ -6164,7 +6164,7 @@
     </p:spTree>
     <p:extLst>
       <p:ext uri="{BB962C8B-B14F-4D97-AF65-F5344CB8AC3E}">
-        <p14:creationId xmlns:p14="http://schemas.microsoft.com/office/powerpoint/2010/main" val="2305800940"/>
+        <p14:creationId xmlns:p14="http://schemas.microsoft.com/office/powerpoint/2010/main" xmlns="" val="2305800940"/>
       </p:ext>
     </p:extLst>
   </p:cSld>
@@ -6232,7 +6232,7 @@
             <a:fld id="{6FAF76D1-06A1-4878-995B-DD4F41EEDC53}" type="datetimeFigureOut">
               <a:rPr lang="en-US" smtClean="0"/>
               <a:pPr/>
-              <a:t>3/12/2013</a:t>
+              <a:t>3/17/2013</a:t>
             </a:fld>
             <a:endParaRPr lang="en-US"/>
           </a:p>
@@ -6284,7 +6284,7 @@
     </p:spTree>
     <p:extLst>
       <p:ext uri="{BB962C8B-B14F-4D97-AF65-F5344CB8AC3E}">
-        <p14:creationId xmlns:p14="http://schemas.microsoft.com/office/powerpoint/2010/main" val="1950464239"/>
+        <p14:creationId xmlns:p14="http://schemas.microsoft.com/office/powerpoint/2010/main" xmlns="" val="1950464239"/>
       </p:ext>
     </p:extLst>
   </p:cSld>
@@ -6329,7 +6329,7 @@
             <a:fld id="{6FAF76D1-06A1-4878-995B-DD4F41EEDC53}" type="datetimeFigureOut">
               <a:rPr lang="en-US" smtClean="0"/>
               <a:pPr/>
-              <a:t>3/12/2013</a:t>
+              <a:t>3/17/2013</a:t>
             </a:fld>
             <a:endParaRPr lang="en-US"/>
           </a:p>
@@ -6381,7 +6381,7 @@
     </p:spTree>
     <p:extLst>
       <p:ext uri="{BB962C8B-B14F-4D97-AF65-F5344CB8AC3E}">
-        <p14:creationId xmlns:p14="http://schemas.microsoft.com/office/powerpoint/2010/main" val="1459274387"/>
+        <p14:creationId xmlns:p14="http://schemas.microsoft.com/office/powerpoint/2010/main" xmlns="" val="1459274387"/>
       </p:ext>
     </p:extLst>
   </p:cSld>
@@ -6608,7 +6608,7 @@
             <a:fld id="{6FAF76D1-06A1-4878-995B-DD4F41EEDC53}" type="datetimeFigureOut">
               <a:rPr lang="en-US" smtClean="0"/>
               <a:pPr/>
-              <a:t>3/12/2013</a:t>
+              <a:t>3/17/2013</a:t>
             </a:fld>
             <a:endParaRPr lang="en-US"/>
           </a:p>
@@ -6660,7 +6660,7 @@
     </p:spTree>
     <p:extLst>
       <p:ext uri="{BB962C8B-B14F-4D97-AF65-F5344CB8AC3E}">
-        <p14:creationId xmlns:p14="http://schemas.microsoft.com/office/powerpoint/2010/main" val="2291993030"/>
+        <p14:creationId xmlns:p14="http://schemas.microsoft.com/office/powerpoint/2010/main" xmlns="" val="2291993030"/>
       </p:ext>
     </p:extLst>
   </p:cSld>
@@ -6863,7 +6863,7 @@
             <a:fld id="{6FAF76D1-06A1-4878-995B-DD4F41EEDC53}" type="datetimeFigureOut">
               <a:rPr lang="en-US" smtClean="0"/>
               <a:pPr/>
-              <a:t>3/12/2013</a:t>
+              <a:t>3/17/2013</a:t>
             </a:fld>
             <a:endParaRPr lang="en-US"/>
           </a:p>
@@ -6915,7 +6915,7 @@
     </p:spTree>
     <p:extLst>
       <p:ext uri="{BB962C8B-B14F-4D97-AF65-F5344CB8AC3E}">
-        <p14:creationId xmlns:p14="http://schemas.microsoft.com/office/powerpoint/2010/main" val="3199637283"/>
+        <p14:creationId xmlns:p14="http://schemas.microsoft.com/office/powerpoint/2010/main" xmlns="" val="3199637283"/>
       </p:ext>
     </p:extLst>
   </p:cSld>
@@ -7078,7 +7078,7 @@
             <a:fld id="{6FAF76D1-06A1-4878-995B-DD4F41EEDC53}" type="datetimeFigureOut">
               <a:rPr lang="en-US" smtClean="0"/>
               <a:pPr/>
-              <a:t>3/12/2013</a:t>
+              <a:t>3/17/2013</a:t>
             </a:fld>
             <a:endParaRPr lang="en-US"/>
           </a:p>
@@ -7166,7 +7166,7 @@
     </p:spTree>
     <p:extLst>
       <p:ext uri="{BB962C8B-B14F-4D97-AF65-F5344CB8AC3E}">
-        <p14:creationId xmlns:p14="http://schemas.microsoft.com/office/powerpoint/2010/main" val="1832702352"/>
+        <p14:creationId xmlns:p14="http://schemas.microsoft.com/office/powerpoint/2010/main" xmlns="" val="1832702352"/>
       </p:ext>
     </p:extLst>
   </p:cSld>
@@ -7644,7 +7644,7 @@
     </p:spTree>
     <p:extLst>
       <p:ext uri="{BB962C8B-B14F-4D97-AF65-F5344CB8AC3E}">
-        <p14:creationId xmlns:p14="http://schemas.microsoft.com/office/powerpoint/2010/main" val="2225840098"/>
+        <p14:creationId xmlns:p14="http://schemas.microsoft.com/office/powerpoint/2010/main" xmlns="" val="2225840098"/>
       </p:ext>
     </p:extLst>
   </p:cSld>
@@ -8000,7 +8000,7 @@
     </p:spTree>
     <p:extLst>
       <p:ext uri="{BB962C8B-B14F-4D97-AF65-F5344CB8AC3E}">
-        <p14:creationId xmlns:p14="http://schemas.microsoft.com/office/powerpoint/2010/main" val="535094417"/>
+        <p14:creationId xmlns:p14="http://schemas.microsoft.com/office/powerpoint/2010/main" xmlns="" val="535094417"/>
       </p:ext>
     </p:extLst>
   </p:cSld>
@@ -8392,13 +8392,8 @@
             </a:pPr>
             <a:r>
               <a:rPr lang="en-US" sz="3600" dirty="0" smtClean="0"/>
-              <a:t>View </a:t>
-            </a:r>
-            <a:r>
-              <a:rPr lang="en-US" sz="3600" dirty="0" smtClean="0"/>
-              <a:t>cookie content</a:t>
-            </a:r>
-            <a:endParaRPr lang="en-US" sz="3600" dirty="0" smtClean="0"/>
+              <a:t>View cookie content</a:t>
+            </a:r>
           </a:p>
           <a:p>
             <a:pPr marL="457200" indent="-457200">
@@ -8409,7 +8404,6 @@
               <a:rPr lang="en-US" sz="3600" dirty="0" smtClean="0"/>
               <a:t>Intercept traffic </a:t>
             </a:r>
-            <a:endParaRPr lang="en-US" sz="3600" dirty="0" smtClean="0"/>
           </a:p>
           <a:p>
             <a:pPr marL="914400" lvl="1" indent="-457200">
@@ -8422,17 +8416,8 @@
             </a:r>
             <a:r>
               <a:rPr lang="en-US" sz="3600" dirty="0" smtClean="0"/>
-              <a:t> </a:t>
-            </a:r>
-            <a:r>
-              <a:rPr lang="en-US" sz="3600" dirty="0" smtClean="0"/>
-              <a:t>or </a:t>
-            </a:r>
-            <a:r>
-              <a:rPr lang="en-US" sz="3600" dirty="0" smtClean="0"/>
-              <a:t>Fiddler</a:t>
-            </a:r>
-            <a:endParaRPr lang="en-US" sz="3600" dirty="0" smtClean="0"/>
+              <a:t> or Fiddler</a:t>
+            </a:r>
           </a:p>
           <a:p>
             <a:pPr marL="457200" indent="-457200">
@@ -8451,11 +8436,7 @@
             </a:pPr>
             <a:r>
               <a:rPr lang="en-US" sz="3600" dirty="0" smtClean="0"/>
-              <a:t>Chrome: edit this </a:t>
-            </a:r>
-            <a:r>
-              <a:rPr lang="en-US" sz="3600" dirty="0" smtClean="0"/>
-              <a:t>cookie</a:t>
+              <a:t>Chrome: edit this cookie</a:t>
             </a:r>
           </a:p>
           <a:p>
@@ -8471,14 +8452,13 @@
               <a:rPr lang="en-US" sz="3600" dirty="0" smtClean="0"/>
               <a:t> Console</a:t>
             </a:r>
-            <a:endParaRPr lang="en-US" sz="3600" dirty="0" smtClean="0"/>
           </a:p>
         </p:txBody>
       </p:sp>
     </p:spTree>
     <p:extLst>
       <p:ext uri="{BB962C8B-B14F-4D97-AF65-F5344CB8AC3E}">
-        <p14:creationId xmlns:p14="http://schemas.microsoft.com/office/powerpoint/2010/main" val="32028867"/>
+        <p14:creationId xmlns:p14="http://schemas.microsoft.com/office/powerpoint/2010/main" xmlns="" val="32028867"/>
       </p:ext>
     </p:extLst>
   </p:cSld>
@@ -9157,7 +9137,7 @@
     </p:spTree>
     <p:extLst>
       <p:ext uri="{BB962C8B-B14F-4D97-AF65-F5344CB8AC3E}">
-        <p14:creationId xmlns:p14="http://schemas.microsoft.com/office/powerpoint/2010/main" val="535094417"/>
+        <p14:creationId xmlns:p14="http://schemas.microsoft.com/office/powerpoint/2010/main" xmlns="" val="535094417"/>
       </p:ext>
     </p:extLst>
   </p:cSld>
@@ -9463,7 +9443,7 @@
     </p:spTree>
     <p:extLst>
       <p:ext uri="{BB962C8B-B14F-4D97-AF65-F5344CB8AC3E}">
-        <p14:creationId xmlns:p14="http://schemas.microsoft.com/office/powerpoint/2010/main" val="535094417"/>
+        <p14:creationId xmlns:p14="http://schemas.microsoft.com/office/powerpoint/2010/main" xmlns="" val="535094417"/>
       </p:ext>
     </p:extLst>
   </p:cSld>
@@ -10008,7 +9988,6 @@
               <a:rPr lang="en-US" sz="2400" dirty="0" smtClean="0"/>
               <a:t>; q=0.5, en</a:t>
             </a:r>
-            <a:endParaRPr lang="en-US" sz="2400" dirty="0" smtClean="0"/>
           </a:p>
           <a:p>
             <a:r>
@@ -10043,7 +10022,7 @@
     </p:spTree>
     <p:extLst>
       <p:ext uri="{BB962C8B-B14F-4D97-AF65-F5344CB8AC3E}">
-        <p14:creationId xmlns:p14="http://schemas.microsoft.com/office/powerpoint/2010/main" val="535094417"/>
+        <p14:creationId xmlns:p14="http://schemas.microsoft.com/office/powerpoint/2010/main" xmlns="" val="535094417"/>
       </p:ext>
     </p:extLst>
   </p:cSld>
@@ -10708,7 +10687,7 @@
     </p:spTree>
     <p:extLst>
       <p:ext uri="{BB962C8B-B14F-4D97-AF65-F5344CB8AC3E}">
-        <p14:creationId xmlns:p14="http://schemas.microsoft.com/office/powerpoint/2010/main" val="535094417"/>
+        <p14:creationId xmlns:p14="http://schemas.microsoft.com/office/powerpoint/2010/main" xmlns="" val="535094417"/>
       </p:ext>
     </p:extLst>
   </p:cSld>
@@ -11278,7 +11257,7 @@
     </p:spTree>
     <p:extLst>
       <p:ext uri="{BB962C8B-B14F-4D97-AF65-F5344CB8AC3E}">
-        <p14:creationId xmlns:p14="http://schemas.microsoft.com/office/powerpoint/2010/main" val="535094417"/>
+        <p14:creationId xmlns:p14="http://schemas.microsoft.com/office/powerpoint/2010/main" xmlns="" val="535094417"/>
       </p:ext>
     </p:extLst>
   </p:cSld>
@@ -11865,7 +11844,7 @@
     </p:spTree>
     <p:extLst>
       <p:ext uri="{BB962C8B-B14F-4D97-AF65-F5344CB8AC3E}">
-        <p14:creationId xmlns:p14="http://schemas.microsoft.com/office/powerpoint/2010/main" val="535094417"/>
+        <p14:creationId xmlns:p14="http://schemas.microsoft.com/office/powerpoint/2010/main" xmlns="" val="535094417"/>
       </p:ext>
     </p:extLst>
   </p:cSld>
@@ -12418,22 +12397,13 @@
           <a:p>
             <a:r>
               <a:rPr lang="en-US" sz="3600" dirty="0" smtClean="0"/>
-              <a:t>Internet </a:t>
-            </a:r>
+              <a:t>Internet Explorer </a:t>
+            </a:r>
+          </a:p>
+          <a:p>
             <a:r>
               <a:rPr lang="en-US" sz="3600" dirty="0" smtClean="0"/>
-              <a:t>Explorer </a:t>
-            </a:r>
-            <a:endParaRPr lang="en-US" sz="3600" dirty="0" smtClean="0"/>
-          </a:p>
-          <a:p>
-            <a:r>
-              <a:rPr lang="en-US" sz="3600" dirty="0" smtClean="0"/>
-              <a:t>				6, 7, 8, 9, </a:t>
-            </a:r>
-            <a:r>
-              <a:rPr lang="en-US" sz="3600" dirty="0" smtClean="0"/>
-              <a:t>10?</a:t>
+              <a:t>				6, 7, 8, 9, 10?</a:t>
             </a:r>
           </a:p>
           <a:p>
@@ -12455,14 +12425,13 @@
               <a:rPr lang="en-US" sz="3600" dirty="0" smtClean="0"/>
               <a:t>Mobile Devices</a:t>
             </a:r>
-            <a:endParaRPr lang="en-US" sz="3600" dirty="0" smtClean="0"/>
           </a:p>
         </p:txBody>
       </p:sp>
     </p:spTree>
     <p:extLst>
       <p:ext uri="{BB962C8B-B14F-4D97-AF65-F5344CB8AC3E}">
-        <p14:creationId xmlns:p14="http://schemas.microsoft.com/office/powerpoint/2010/main" val="535094417"/>
+        <p14:creationId xmlns:p14="http://schemas.microsoft.com/office/powerpoint/2010/main" xmlns="" val="535094417"/>
       </p:ext>
     </p:extLst>
   </p:cSld>
@@ -13230,7 +13199,7 @@
     </p:spTree>
     <p:extLst>
       <p:ext uri="{BB962C8B-B14F-4D97-AF65-F5344CB8AC3E}">
-        <p14:creationId xmlns:p14="http://schemas.microsoft.com/office/powerpoint/2010/main" val="535094417"/>
+        <p14:creationId xmlns:p14="http://schemas.microsoft.com/office/powerpoint/2010/main" xmlns="" val="535094417"/>
       </p:ext>
     </p:extLst>
   </p:cSld>
@@ -14106,7 +14075,7 @@
     </p:spTree>
     <p:extLst>
       <p:ext uri="{BB962C8B-B14F-4D97-AF65-F5344CB8AC3E}">
-        <p14:creationId xmlns:p14="http://schemas.microsoft.com/office/powerpoint/2010/main" val="3062231615"/>
+        <p14:creationId xmlns:p14="http://schemas.microsoft.com/office/powerpoint/2010/main" xmlns="" val="3062231615"/>
       </p:ext>
     </p:extLst>
   </p:cSld>
@@ -14563,7 +14532,7 @@
     </p:spTree>
     <p:extLst>
       <p:ext uri="{BB962C8B-B14F-4D97-AF65-F5344CB8AC3E}">
-        <p14:creationId xmlns:p14="http://schemas.microsoft.com/office/powerpoint/2010/main" val="535094417"/>
+        <p14:creationId xmlns:p14="http://schemas.microsoft.com/office/powerpoint/2010/main" xmlns="" val="535094417"/>
       </p:ext>
     </p:extLst>
   </p:cSld>
@@ -15463,7 +15432,7 @@
     </p:spTree>
     <p:extLst>
       <p:ext uri="{BB962C8B-B14F-4D97-AF65-F5344CB8AC3E}">
-        <p14:creationId xmlns:p14="http://schemas.microsoft.com/office/powerpoint/2010/main" val="535094417"/>
+        <p14:creationId xmlns:p14="http://schemas.microsoft.com/office/powerpoint/2010/main" xmlns="" val="535094417"/>
       </p:ext>
     </p:extLst>
   </p:cSld>
@@ -16679,7 +16648,7 @@
     </p:spTree>
     <p:extLst>
       <p:ext uri="{BB962C8B-B14F-4D97-AF65-F5344CB8AC3E}">
-        <p14:creationId xmlns:p14="http://schemas.microsoft.com/office/powerpoint/2010/main" val="3019721497"/>
+        <p14:creationId xmlns:p14="http://schemas.microsoft.com/office/powerpoint/2010/main" xmlns="" val="3019721497"/>
       </p:ext>
     </p:extLst>
   </p:cSld>
@@ -17268,7 +17237,7 @@
     </p:spTree>
     <p:extLst>
       <p:ext uri="{BB962C8B-B14F-4D97-AF65-F5344CB8AC3E}">
-        <p14:creationId xmlns:p14="http://schemas.microsoft.com/office/powerpoint/2010/main" val="535094417"/>
+        <p14:creationId xmlns:p14="http://schemas.microsoft.com/office/powerpoint/2010/main" xmlns="" val="535094417"/>
       </p:ext>
     </p:extLst>
   </p:cSld>
@@ -18043,7 +18012,7 @@
     </p:spTree>
     <p:extLst>
       <p:ext uri="{BB962C8B-B14F-4D97-AF65-F5344CB8AC3E}">
-        <p14:creationId xmlns:p14="http://schemas.microsoft.com/office/powerpoint/2010/main" val="535094417"/>
+        <p14:creationId xmlns:p14="http://schemas.microsoft.com/office/powerpoint/2010/main" xmlns="" val="535094417"/>
       </p:ext>
     </p:extLst>
   </p:cSld>
@@ -18733,7 +18702,7 @@
     </p:spTree>
     <p:extLst>
       <p:ext uri="{BB962C8B-B14F-4D97-AF65-F5344CB8AC3E}">
-        <p14:creationId xmlns:p14="http://schemas.microsoft.com/office/powerpoint/2010/main" val="535094417"/>
+        <p14:creationId xmlns:p14="http://schemas.microsoft.com/office/powerpoint/2010/main" xmlns="" val="535094417"/>
       </p:ext>
     </p:extLst>
   </p:cSld>
@@ -19670,7 +19639,7 @@
     </p:spTree>
     <p:extLst>
       <p:ext uri="{BB962C8B-B14F-4D97-AF65-F5344CB8AC3E}">
-        <p14:creationId xmlns:p14="http://schemas.microsoft.com/office/powerpoint/2010/main" val="535094417"/>
+        <p14:creationId xmlns:p14="http://schemas.microsoft.com/office/powerpoint/2010/main" xmlns="" val="535094417"/>
       </p:ext>
     </p:extLst>
   </p:cSld>
@@ -20295,7 +20264,7 @@
     </p:spTree>
     <p:extLst>
       <p:ext uri="{BB962C8B-B14F-4D97-AF65-F5344CB8AC3E}">
-        <p14:creationId xmlns:p14="http://schemas.microsoft.com/office/powerpoint/2010/main" val="535094417"/>
+        <p14:creationId xmlns:p14="http://schemas.microsoft.com/office/powerpoint/2010/main" xmlns="" val="535094417"/>
       </p:ext>
     </p:extLst>
   </p:cSld>
@@ -20976,8 +20945,8 @@
         </p:nvSpPr>
         <p:spPr>
           <a:xfrm>
-            <a:off x="2133600" y="2057400"/>
-            <a:ext cx="4876800" cy="3785652"/>
+            <a:off x="2133600" y="1981200"/>
+            <a:ext cx="4876800" cy="4154984"/>
           </a:xfrm>
           <a:prstGeom prst="rect">
             <a:avLst/>
@@ -21050,7 +21019,17 @@
           <a:p>
             <a:r>
               <a:rPr lang="en-US" sz="2400" dirty="0" smtClean="0"/>
-              <a:t>Pixel Perfect</a:t>
+              <a:t>Pixel </a:t>
+            </a:r>
+            <a:r>
+              <a:rPr lang="en-US" sz="2400" dirty="0" smtClean="0"/>
+              <a:t>Perfect</a:t>
+            </a:r>
+          </a:p>
+          <a:p>
+            <a:r>
+              <a:rPr lang="en-US" sz="2400" dirty="0" smtClean="0"/>
+              <a:t>YSLOW</a:t>
             </a:r>
             <a:endParaRPr lang="en-US" sz="2400" dirty="0"/>
           </a:p>
@@ -21059,7 +21038,7 @@
     </p:spTree>
     <p:extLst>
       <p:ext uri="{BB962C8B-B14F-4D97-AF65-F5344CB8AC3E}">
-        <p14:creationId xmlns:p14="http://schemas.microsoft.com/office/powerpoint/2010/main" val="12518754"/>
+        <p14:creationId xmlns:p14="http://schemas.microsoft.com/office/powerpoint/2010/main" xmlns="" val="12518754"/>
       </p:ext>
     </p:extLst>
   </p:cSld>
@@ -21457,11 +21436,7 @@
           <a:p>
             <a:r>
               <a:rPr lang="en-US" sz="3600" dirty="0" smtClean="0"/>
-              <a:t>HTML </a:t>
-            </a:r>
-            <a:r>
-              <a:rPr lang="en-US" sz="3600" dirty="0" smtClean="0"/>
-              <a:t>validator</a:t>
+              <a:t>HTML validator</a:t>
             </a:r>
           </a:p>
           <a:p>
@@ -21476,7 +21451,6 @@
               <a:rPr lang="en-US" sz="3600" dirty="0" smtClean="0"/>
               <a:t>Plugins</a:t>
             </a:r>
-            <a:endParaRPr lang="en-US" sz="3600" dirty="0" smtClean="0"/>
           </a:p>
           <a:p>
             <a:r>
@@ -21495,7 +21469,7 @@
     </p:spTree>
     <p:extLst>
       <p:ext uri="{BB962C8B-B14F-4D97-AF65-F5344CB8AC3E}">
-        <p14:creationId xmlns:p14="http://schemas.microsoft.com/office/powerpoint/2010/main" val="1271748606"/>
+        <p14:creationId xmlns:p14="http://schemas.microsoft.com/office/powerpoint/2010/main" xmlns="" val="1271748606"/>
       </p:ext>
     </p:extLst>
   </p:cSld>
@@ -22287,7 +22261,7 @@
     </p:spTree>
     <p:extLst>
       <p:ext uri="{BB962C8B-B14F-4D97-AF65-F5344CB8AC3E}">
-        <p14:creationId xmlns:p14="http://schemas.microsoft.com/office/powerpoint/2010/main" val="535094417"/>
+        <p14:creationId xmlns:p14="http://schemas.microsoft.com/office/powerpoint/2010/main" xmlns="" val="535094417"/>
       </p:ext>
     </p:extLst>
   </p:cSld>
@@ -22829,7 +22803,7 @@
     </p:spTree>
     <p:extLst>
       <p:ext uri="{BB962C8B-B14F-4D97-AF65-F5344CB8AC3E}">
-        <p14:creationId xmlns:p14="http://schemas.microsoft.com/office/powerpoint/2010/main" val="535094417"/>
+        <p14:creationId xmlns:p14="http://schemas.microsoft.com/office/powerpoint/2010/main" xmlns="" val="535094417"/>
       </p:ext>
     </p:extLst>
   </p:cSld>
@@ -23228,13 +23202,7 @@
               <a:rPr lang="en-US" sz="2400" dirty="0" smtClean="0">
                 <a:hlinkClick r:id="rId5"/>
               </a:rPr>
-              <a:t>http</a:t>
-            </a:r>
-            <a:r>
-              <a:rPr lang="en-US" sz="2400" dirty="0" smtClean="0">
-                <a:hlinkClick r:id="rId5"/>
-              </a:rPr>
-              <a:t>://jigsaw.w3.org/css-validator/</a:t>
+              <a:t>http://jigsaw.w3.org/css-validator/</a:t>
             </a:r>
             <a:endParaRPr lang="en-US" sz="2400" dirty="0" smtClean="0"/>
           </a:p>
@@ -23272,7 +23240,7 @@
     </p:spTree>
     <p:extLst>
       <p:ext uri="{BB962C8B-B14F-4D97-AF65-F5344CB8AC3E}">
-        <p14:creationId xmlns:p14="http://schemas.microsoft.com/office/powerpoint/2010/main" val="1710283614"/>
+        <p14:creationId xmlns:p14="http://schemas.microsoft.com/office/powerpoint/2010/main" xmlns="" val="1710283614"/>
       </p:ext>
     </p:extLst>
   </p:cSld>
@@ -23939,7 +23907,7 @@
     </p:spTree>
     <p:extLst>
       <p:ext uri="{BB962C8B-B14F-4D97-AF65-F5344CB8AC3E}">
-        <p14:creationId xmlns:p14="http://schemas.microsoft.com/office/powerpoint/2010/main" val="1710283614"/>
+        <p14:creationId xmlns:p14="http://schemas.microsoft.com/office/powerpoint/2010/main" xmlns="" val="1710283614"/>
       </p:ext>
     </p:extLst>
   </p:cSld>
@@ -24605,7 +24573,7 @@
     </p:spTree>
     <p:extLst>
       <p:ext uri="{BB962C8B-B14F-4D97-AF65-F5344CB8AC3E}">
-        <p14:creationId xmlns:p14="http://schemas.microsoft.com/office/powerpoint/2010/main" val="535094417"/>
+        <p14:creationId xmlns:p14="http://schemas.microsoft.com/office/powerpoint/2010/main" xmlns="" val="535094417"/>
       </p:ext>
     </p:extLst>
   </p:cSld>
@@ -25385,11 +25353,7 @@
           <a:p>
             <a:r>
               <a:rPr lang="en-US" sz="2400" dirty="0" smtClean="0"/>
-              <a:t>	</a:t>
-            </a:r>
-            <a:r>
-              <a:rPr lang="en-US" sz="2400" dirty="0" smtClean="0"/>
-              <a:t>Select/Options</a:t>
+              <a:t>	Select/Options</a:t>
             </a:r>
             <a:br>
               <a:rPr lang="en-US" sz="2400" dirty="0" smtClean="0"/>
@@ -25436,7 +25400,7 @@
     </p:spTree>
     <p:extLst>
       <p:ext uri="{BB962C8B-B14F-4D97-AF65-F5344CB8AC3E}">
-        <p14:creationId xmlns:p14="http://schemas.microsoft.com/office/powerpoint/2010/main" val="1710283614"/>
+        <p14:creationId xmlns:p14="http://schemas.microsoft.com/office/powerpoint/2010/main" xmlns="" val="1710283614"/>
       </p:ext>
     </p:extLst>
   </p:cSld>

</xml_diff>